<commit_message>
Added animations and a main "at a glance" view of the UI
</commit_message>
<xml_diff>
--- a/Documentation/Training/MainUI.pptx
+++ b/Documentation/Training/MainUI.pptx
@@ -5,17 +5,18 @@
     <p:sldMasterId id="2147483648" r:id="rId1"/>
   </p:sldMasterIdLst>
   <p:notesMasterIdLst>
-    <p:notesMasterId r:id="rId10"/>
+    <p:notesMasterId r:id="rId11"/>
   </p:notesMasterIdLst>
   <p:sldIdLst>
     <p:sldId id="256" r:id="rId2"/>
-    <p:sldId id="281" r:id="rId3"/>
-    <p:sldId id="272" r:id="rId4"/>
-    <p:sldId id="282" r:id="rId5"/>
-    <p:sldId id="283" r:id="rId6"/>
-    <p:sldId id="273" r:id="rId7"/>
-    <p:sldId id="284" r:id="rId8"/>
-    <p:sldId id="285" r:id="rId9"/>
+    <p:sldId id="286" r:id="rId3"/>
+    <p:sldId id="281" r:id="rId4"/>
+    <p:sldId id="272" r:id="rId5"/>
+    <p:sldId id="282" r:id="rId6"/>
+    <p:sldId id="283" r:id="rId7"/>
+    <p:sldId id="273" r:id="rId8"/>
+    <p:sldId id="284" r:id="rId9"/>
+    <p:sldId id="285" r:id="rId10"/>
   </p:sldIdLst>
   <p:sldSz cx="12192000" cy="6858000"/>
   <p:notesSz cx="6858000" cy="9144000"/>
@@ -120,6 +121,7 @@
         <p14:section name="Default Section" id="{4C02BD7C-A78F-47F6-AB11-C75334F38197}">
           <p14:sldIdLst>
             <p14:sldId id="256"/>
+            <p14:sldId id="286"/>
             <p14:sldId id="281"/>
             <p14:sldId id="272"/>
             <p14:sldId id="282"/>
@@ -223,7 +225,7 @@
           <a:p>
             <a:fld id="{E6799723-5C7A-4148-A580-1582FB869D21}" type="datetimeFigureOut">
               <a:rPr lang="en-GB" smtClean="0"/>
-              <a:t>28/10/2019</a:t>
+              <a:t>30/10/2019</a:t>
             </a:fld>
             <a:endParaRPr lang="en-GB"/>
           </a:p>
@@ -619,10 +621,7 @@
           <a:bodyPr/>
           <a:lstStyle/>
           <a:p>
-            <a:r>
-              <a:rPr lang="en-GB" dirty="0"/>
-              <a:t>All the 3 methods above take you to the Wizard, so it’s really just a matter of preferences and of what people remember.</a:t>
-            </a:r>
+            <a:endParaRPr lang="en-GB" dirty="0"/>
           </a:p>
         </p:txBody>
       </p:sp>
@@ -643,7 +642,7 @@
           <a:p>
             <a:fld id="{F1738015-88EA-481E-8FC9-2B0FD70A3B16}" type="slidenum">
               <a:rPr lang="en-GB" smtClean="0"/>
-              <a:t>2</a:t>
+              <a:t>3</a:t>
             </a:fld>
             <a:endParaRPr lang="en-GB"/>
           </a:p>
@@ -730,7 +729,7 @@
           <a:p>
             <a:fld id="{F1738015-88EA-481E-8FC9-2B0FD70A3B16}" type="slidenum">
               <a:rPr lang="en-GB" smtClean="0"/>
-              <a:t>3</a:t>
+              <a:t>4</a:t>
             </a:fld>
             <a:endParaRPr lang="en-GB"/>
           </a:p>
@@ -793,10 +792,7 @@
           <a:bodyPr/>
           <a:lstStyle/>
           <a:p>
-            <a:r>
-              <a:rPr lang="en-GB" dirty="0"/>
-              <a:t>All the 3 methods above take you to the Wizard, so it’s really just a matter of preferences and of what people remember.</a:t>
-            </a:r>
+            <a:endParaRPr lang="en-GB" dirty="0"/>
           </a:p>
         </p:txBody>
       </p:sp>
@@ -817,7 +813,7 @@
           <a:p>
             <a:fld id="{F1738015-88EA-481E-8FC9-2B0FD70A3B16}" type="slidenum">
               <a:rPr lang="en-GB" smtClean="0"/>
-              <a:t>6</a:t>
+              <a:t>7</a:t>
             </a:fld>
             <a:endParaRPr lang="en-GB"/>
           </a:p>
@@ -880,10 +876,7 @@
           <a:bodyPr/>
           <a:lstStyle/>
           <a:p>
-            <a:r>
-              <a:rPr lang="en-GB" dirty="0"/>
-              <a:t>All the 3 methods above take you to the Wizard, so it’s really just a matter of preferences and of what people remember.</a:t>
-            </a:r>
+            <a:endParaRPr lang="en-GB" dirty="0"/>
           </a:p>
         </p:txBody>
       </p:sp>
@@ -904,7 +897,7 @@
           <a:p>
             <a:fld id="{F1738015-88EA-481E-8FC9-2B0FD70A3B16}" type="slidenum">
               <a:rPr lang="en-GB" smtClean="0"/>
-              <a:t>7</a:t>
+              <a:t>8</a:t>
             </a:fld>
             <a:endParaRPr lang="en-GB"/>
           </a:p>
@@ -967,10 +960,7 @@
           <a:bodyPr/>
           <a:lstStyle/>
           <a:p>
-            <a:r>
-              <a:rPr lang="en-GB" dirty="0"/>
-              <a:t>All the 3 methods above take you to the Wizard, so it’s really just a matter of preferences and of what people remember.</a:t>
-            </a:r>
+            <a:endParaRPr lang="en-GB" dirty="0"/>
           </a:p>
         </p:txBody>
       </p:sp>
@@ -991,7 +981,7 @@
           <a:p>
             <a:fld id="{F1738015-88EA-481E-8FC9-2B0FD70A3B16}" type="slidenum">
               <a:rPr lang="en-GB" smtClean="0"/>
-              <a:t>8</a:t>
+              <a:t>9</a:t>
             </a:fld>
             <a:endParaRPr lang="en-GB"/>
           </a:p>
@@ -1141,7 +1131,7 @@
           <a:p>
             <a:fld id="{A4B2E03E-B9F4-48CD-BEDC-03BA93144C1F}" type="datetimeFigureOut">
               <a:rPr lang="en-GB" smtClean="0"/>
-              <a:t>28/10/2019</a:t>
+              <a:t>30/10/2019</a:t>
             </a:fld>
             <a:endParaRPr lang="en-GB"/>
           </a:p>
@@ -1311,7 +1301,7 @@
           <a:p>
             <a:fld id="{A4B2E03E-B9F4-48CD-BEDC-03BA93144C1F}" type="datetimeFigureOut">
               <a:rPr lang="en-GB" smtClean="0"/>
-              <a:t>28/10/2019</a:t>
+              <a:t>30/10/2019</a:t>
             </a:fld>
             <a:endParaRPr lang="en-GB"/>
           </a:p>
@@ -1491,7 +1481,7 @@
           <a:p>
             <a:fld id="{A4B2E03E-B9F4-48CD-BEDC-03BA93144C1F}" type="datetimeFigureOut">
               <a:rPr lang="en-GB" smtClean="0"/>
-              <a:t>28/10/2019</a:t>
+              <a:t>30/10/2019</a:t>
             </a:fld>
             <a:endParaRPr lang="en-GB"/>
           </a:p>
@@ -1661,7 +1651,7 @@
           <a:p>
             <a:fld id="{A4B2E03E-B9F4-48CD-BEDC-03BA93144C1F}" type="datetimeFigureOut">
               <a:rPr lang="en-GB" smtClean="0"/>
-              <a:t>28/10/2019</a:t>
+              <a:t>30/10/2019</a:t>
             </a:fld>
             <a:endParaRPr lang="en-GB"/>
           </a:p>
@@ -1907,7 +1897,7 @@
           <a:p>
             <a:fld id="{A4B2E03E-B9F4-48CD-BEDC-03BA93144C1F}" type="datetimeFigureOut">
               <a:rPr lang="en-GB" smtClean="0"/>
-              <a:t>28/10/2019</a:t>
+              <a:t>30/10/2019</a:t>
             </a:fld>
             <a:endParaRPr lang="en-GB"/>
           </a:p>
@@ -2139,7 +2129,7 @@
           <a:p>
             <a:fld id="{A4B2E03E-B9F4-48CD-BEDC-03BA93144C1F}" type="datetimeFigureOut">
               <a:rPr lang="en-GB" smtClean="0"/>
-              <a:t>28/10/2019</a:t>
+              <a:t>30/10/2019</a:t>
             </a:fld>
             <a:endParaRPr lang="en-GB"/>
           </a:p>
@@ -2506,7 +2496,7 @@
           <a:p>
             <a:fld id="{A4B2E03E-B9F4-48CD-BEDC-03BA93144C1F}" type="datetimeFigureOut">
               <a:rPr lang="en-GB" smtClean="0"/>
-              <a:t>28/10/2019</a:t>
+              <a:t>30/10/2019</a:t>
             </a:fld>
             <a:endParaRPr lang="en-GB"/>
           </a:p>
@@ -2624,7 +2614,7 @@
           <a:p>
             <a:fld id="{A4B2E03E-B9F4-48CD-BEDC-03BA93144C1F}" type="datetimeFigureOut">
               <a:rPr lang="en-GB" smtClean="0"/>
-              <a:t>28/10/2019</a:t>
+              <a:t>30/10/2019</a:t>
             </a:fld>
             <a:endParaRPr lang="en-GB"/>
           </a:p>
@@ -2719,7 +2709,7 @@
           <a:p>
             <a:fld id="{A4B2E03E-B9F4-48CD-BEDC-03BA93144C1F}" type="datetimeFigureOut">
               <a:rPr lang="en-GB" smtClean="0"/>
-              <a:t>28/10/2019</a:t>
+              <a:t>30/10/2019</a:t>
             </a:fld>
             <a:endParaRPr lang="en-GB"/>
           </a:p>
@@ -2996,7 +2986,7 @@
           <a:p>
             <a:fld id="{A4B2E03E-B9F4-48CD-BEDC-03BA93144C1F}" type="datetimeFigureOut">
               <a:rPr lang="en-GB" smtClean="0"/>
-              <a:t>28/10/2019</a:t>
+              <a:t>30/10/2019</a:t>
             </a:fld>
             <a:endParaRPr lang="en-GB"/>
           </a:p>
@@ -3249,7 +3239,7 @@
           <a:p>
             <a:fld id="{A4B2E03E-B9F4-48CD-BEDC-03BA93144C1F}" type="datetimeFigureOut">
               <a:rPr lang="en-GB" smtClean="0"/>
-              <a:t>28/10/2019</a:t>
+              <a:t>30/10/2019</a:t>
             </a:fld>
             <a:endParaRPr lang="en-GB"/>
           </a:p>
@@ -3462,7 +3452,7 @@
           <a:p>
             <a:fld id="{A4B2E03E-B9F4-48CD-BEDC-03BA93144C1F}" type="datetimeFigureOut">
               <a:rPr lang="en-GB" smtClean="0"/>
-              <a:t>28/10/2019</a:t>
+              <a:t>30/10/2019</a:t>
             </a:fld>
             <a:endParaRPr lang="en-GB"/>
           </a:p>
@@ -3948,6 +3938,787 @@
           <p:cNvPr id="2" name="Title 1">
             <a:extLst>
               <a:ext uri="{FF2B5EF4-FFF2-40B4-BE49-F238E27FC236}">
+                <a16:creationId xmlns:a16="http://schemas.microsoft.com/office/drawing/2014/main" id="{C8997539-A1D4-4098-B229-09B11EA01F81}"/>
+              </a:ext>
+            </a:extLst>
+          </p:cNvPr>
+          <p:cNvSpPr>
+            <a:spLocks noGrp="1"/>
+          </p:cNvSpPr>
+          <p:nvPr>
+            <p:ph type="title"/>
+          </p:nvPr>
+        </p:nvSpPr>
+        <p:spPr/>
+        <p:txBody>
+          <a:bodyPr/>
+          <a:lstStyle/>
+          <a:p>
+            <a:r>
+              <a:rPr lang="en-GB" dirty="0"/>
+              <a:t>At a glance</a:t>
+            </a:r>
+          </a:p>
+        </p:txBody>
+      </p:sp>
+      <p:pic>
+        <p:nvPicPr>
+          <p:cNvPr id="4" name="Picture 3">
+            <a:extLst>
+              <a:ext uri="{FF2B5EF4-FFF2-40B4-BE49-F238E27FC236}">
+                <a16:creationId xmlns:a16="http://schemas.microsoft.com/office/drawing/2014/main" id="{051EDC94-89EE-4D6D-976E-6AEDA8AE8C60}"/>
+              </a:ext>
+            </a:extLst>
+          </p:cNvPr>
+          <p:cNvPicPr>
+            <a:picLocks noChangeAspect="1"/>
+          </p:cNvPicPr>
+          <p:nvPr/>
+        </p:nvPicPr>
+        <p:blipFill rotWithShape="1">
+          <a:blip r:embed="rId2"/>
+          <a:srcRect b="4974"/>
+          <a:stretch/>
+        </p:blipFill>
+        <p:spPr>
+          <a:xfrm>
+            <a:off x="143857" y="247453"/>
+            <a:ext cx="11904286" cy="6363093"/>
+          </a:xfrm>
+          <a:prstGeom prst="rect">
+            <a:avLst/>
+          </a:prstGeom>
+        </p:spPr>
+      </p:pic>
+      <p:grpSp>
+        <p:nvGrpSpPr>
+          <p:cNvPr id="5" name="Group 4">
+            <a:extLst>
+              <a:ext uri="{FF2B5EF4-FFF2-40B4-BE49-F238E27FC236}">
+                <a16:creationId xmlns:a16="http://schemas.microsoft.com/office/drawing/2014/main" id="{C8DE6D6B-69F6-40D9-99CC-91FF128773DD}"/>
+              </a:ext>
+            </a:extLst>
+          </p:cNvPr>
+          <p:cNvGrpSpPr/>
+          <p:nvPr/>
+        </p:nvGrpSpPr>
+        <p:grpSpPr>
+          <a:xfrm>
+            <a:off x="8146381" y="343147"/>
+            <a:ext cx="2037337" cy="315446"/>
+            <a:chOff x="4667962" y="1106429"/>
+            <a:chExt cx="2037337" cy="315446"/>
+          </a:xfrm>
+        </p:grpSpPr>
+        <p:sp>
+          <p:nvSpPr>
+            <p:cNvPr id="6" name="Rectangle: Rounded Corners 5">
+              <a:extLst>
+                <a:ext uri="{FF2B5EF4-FFF2-40B4-BE49-F238E27FC236}">
+                  <a16:creationId xmlns:a16="http://schemas.microsoft.com/office/drawing/2014/main" id="{1D800758-C26D-4578-8107-48733CDAD026}"/>
+                </a:ext>
+              </a:extLst>
+            </p:cNvPr>
+            <p:cNvSpPr/>
+            <p:nvPr/>
+          </p:nvSpPr>
+          <p:spPr>
+            <a:xfrm>
+              <a:off x="5522493" y="1106429"/>
+              <a:ext cx="1182806" cy="315446"/>
+            </a:xfrm>
+            <a:prstGeom prst="roundRect">
+              <a:avLst/>
+            </a:prstGeom>
+          </p:spPr>
+          <p:style>
+            <a:lnRef idx="2">
+              <a:schemeClr val="accent1">
+                <a:shade val="50000"/>
+              </a:schemeClr>
+            </a:lnRef>
+            <a:fillRef idx="1">
+              <a:schemeClr val="accent1"/>
+            </a:fillRef>
+            <a:effectRef idx="0">
+              <a:schemeClr val="accent1"/>
+            </a:effectRef>
+            <a:fontRef idx="minor">
+              <a:schemeClr val="lt1"/>
+            </a:fontRef>
+          </p:style>
+          <p:txBody>
+            <a:bodyPr rtlCol="0" anchor="ctr"/>
+            <a:lstStyle/>
+            <a:p>
+              <a:pPr algn="ctr"/>
+              <a:r>
+                <a:rPr lang="en-GB" sz="1200" dirty="0"/>
+                <a:t>Menu area</a:t>
+              </a:r>
+            </a:p>
+          </p:txBody>
+        </p:sp>
+        <p:cxnSp>
+          <p:nvCxnSpPr>
+            <p:cNvPr id="7" name="Straight Arrow Connector 6">
+              <a:extLst>
+                <a:ext uri="{FF2B5EF4-FFF2-40B4-BE49-F238E27FC236}">
+                  <a16:creationId xmlns:a16="http://schemas.microsoft.com/office/drawing/2014/main" id="{E42BB7B2-CE14-4944-9D0A-74D8C65DDAA5}"/>
+                </a:ext>
+              </a:extLst>
+            </p:cNvPr>
+            <p:cNvCxnSpPr>
+              <a:cxnSpLocks/>
+              <a:stCxn id="6" idx="1"/>
+              <a:endCxn id="10" idx="3"/>
+            </p:cNvCxnSpPr>
+            <p:nvPr/>
+          </p:nvCxnSpPr>
+          <p:spPr>
+            <a:xfrm flipH="1">
+              <a:off x="4667962" y="1264152"/>
+              <a:ext cx="854531" cy="91758"/>
+            </a:xfrm>
+            <a:prstGeom prst="straightConnector1">
+              <a:avLst/>
+            </a:prstGeom>
+            <a:ln w="12700">
+              <a:tailEnd type="triangle"/>
+            </a:ln>
+          </p:spPr>
+          <p:style>
+            <a:lnRef idx="1">
+              <a:schemeClr val="accent1"/>
+            </a:lnRef>
+            <a:fillRef idx="0">
+              <a:schemeClr val="accent1"/>
+            </a:fillRef>
+            <a:effectRef idx="0">
+              <a:schemeClr val="accent1"/>
+            </a:effectRef>
+            <a:fontRef idx="minor">
+              <a:schemeClr val="tx1"/>
+            </a:fontRef>
+          </p:style>
+        </p:cxnSp>
+      </p:grpSp>
+      <p:sp>
+        <p:nvSpPr>
+          <p:cNvPr id="10" name="Rectangle: Rounded Corners 9">
+            <a:extLst>
+              <a:ext uri="{FF2B5EF4-FFF2-40B4-BE49-F238E27FC236}">
+                <a16:creationId xmlns:a16="http://schemas.microsoft.com/office/drawing/2014/main" id="{7DD0FA9B-9538-4B78-8266-2C8C9B2970D7}"/>
+              </a:ext>
+            </a:extLst>
+          </p:cNvPr>
+          <p:cNvSpPr/>
+          <p:nvPr/>
+        </p:nvSpPr>
+        <p:spPr>
+          <a:xfrm>
+            <a:off x="124171" y="365124"/>
+            <a:ext cx="8022210" cy="455007"/>
+          </a:xfrm>
+          <a:prstGeom prst="roundRect">
+            <a:avLst/>
+          </a:prstGeom>
+          <a:solidFill>
+            <a:srgbClr val="0099FF">
+              <a:alpha val="50196"/>
+            </a:srgbClr>
+          </a:solidFill>
+          <a:ln w="28575">
+            <a:solidFill>
+              <a:srgbClr val="FF0000"/>
+            </a:solidFill>
+          </a:ln>
+        </p:spPr>
+        <p:style>
+          <a:lnRef idx="2">
+            <a:schemeClr val="accent1">
+              <a:shade val="50000"/>
+            </a:schemeClr>
+          </a:lnRef>
+          <a:fillRef idx="1">
+            <a:schemeClr val="accent1"/>
+          </a:fillRef>
+          <a:effectRef idx="0">
+            <a:schemeClr val="accent1"/>
+          </a:effectRef>
+          <a:fontRef idx="minor">
+            <a:schemeClr val="lt1"/>
+          </a:fontRef>
+        </p:style>
+        <p:txBody>
+          <a:bodyPr rtlCol="0" anchor="ctr"/>
+          <a:lstStyle/>
+          <a:p>
+            <a:pPr algn="ctr"/>
+            <a:endParaRPr lang="en-GB"/>
+          </a:p>
+        </p:txBody>
+      </p:sp>
+      <p:sp>
+        <p:nvSpPr>
+          <p:cNvPr id="11" name="Rectangle: Rounded Corners 10">
+            <a:extLst>
+              <a:ext uri="{FF2B5EF4-FFF2-40B4-BE49-F238E27FC236}">
+                <a16:creationId xmlns:a16="http://schemas.microsoft.com/office/drawing/2014/main" id="{19F74C96-51B2-4A0A-89B2-AB7A7C616528}"/>
+              </a:ext>
+            </a:extLst>
+          </p:cNvPr>
+          <p:cNvSpPr/>
+          <p:nvPr/>
+        </p:nvSpPr>
+        <p:spPr>
+          <a:xfrm>
+            <a:off x="124171" y="820131"/>
+            <a:ext cx="2986726" cy="5908086"/>
+          </a:xfrm>
+          <a:prstGeom prst="roundRect">
+            <a:avLst>
+              <a:gd name="adj" fmla="val 5305"/>
+            </a:avLst>
+          </a:prstGeom>
+          <a:solidFill>
+            <a:srgbClr val="0099FF">
+              <a:alpha val="50196"/>
+            </a:srgbClr>
+          </a:solidFill>
+          <a:ln w="28575">
+            <a:solidFill>
+              <a:srgbClr val="FF0000"/>
+            </a:solidFill>
+          </a:ln>
+        </p:spPr>
+        <p:style>
+          <a:lnRef idx="2">
+            <a:schemeClr val="accent1">
+              <a:shade val="50000"/>
+            </a:schemeClr>
+          </a:lnRef>
+          <a:fillRef idx="1">
+            <a:schemeClr val="accent1"/>
+          </a:fillRef>
+          <a:effectRef idx="0">
+            <a:schemeClr val="accent1"/>
+          </a:effectRef>
+          <a:fontRef idx="minor">
+            <a:schemeClr val="lt1"/>
+          </a:fontRef>
+        </p:style>
+        <p:txBody>
+          <a:bodyPr rot="0" spcFirstLastPara="0" vertOverflow="overflow" horzOverflow="overflow" vert="horz" wrap="square" lIns="91440" tIns="45720" rIns="91440" bIns="45720" numCol="1" spcCol="0" rtlCol="0" fromWordArt="0" anchor="ctr" anchorCtr="0" forceAA="0" compatLnSpc="1">
+            <a:prstTxWarp prst="textNoShape">
+              <a:avLst/>
+            </a:prstTxWarp>
+            <a:noAutofit/>
+          </a:bodyPr>
+          <a:lstStyle/>
+          <a:p>
+            <a:pPr algn="ctr"/>
+            <a:endParaRPr lang="en-GB"/>
+          </a:p>
+        </p:txBody>
+      </p:sp>
+      <p:sp>
+        <p:nvSpPr>
+          <p:cNvPr id="12" name="Rectangle: Rounded Corners 11">
+            <a:extLst>
+              <a:ext uri="{FF2B5EF4-FFF2-40B4-BE49-F238E27FC236}">
+                <a16:creationId xmlns:a16="http://schemas.microsoft.com/office/drawing/2014/main" id="{4371B89F-6689-467D-B5D4-A4E988651A88}"/>
+              </a:ext>
+            </a:extLst>
+          </p:cNvPr>
+          <p:cNvSpPr/>
+          <p:nvPr/>
+        </p:nvSpPr>
+        <p:spPr>
+          <a:xfrm>
+            <a:off x="3130582" y="820131"/>
+            <a:ext cx="8937247" cy="5908086"/>
+          </a:xfrm>
+          <a:prstGeom prst="roundRect">
+            <a:avLst>
+              <a:gd name="adj" fmla="val 2433"/>
+            </a:avLst>
+          </a:prstGeom>
+          <a:solidFill>
+            <a:srgbClr val="0099FF">
+              <a:alpha val="50196"/>
+            </a:srgbClr>
+          </a:solidFill>
+          <a:ln w="28575">
+            <a:solidFill>
+              <a:srgbClr val="FF0000"/>
+            </a:solidFill>
+          </a:ln>
+        </p:spPr>
+        <p:style>
+          <a:lnRef idx="2">
+            <a:schemeClr val="accent1">
+              <a:shade val="50000"/>
+            </a:schemeClr>
+          </a:lnRef>
+          <a:fillRef idx="1">
+            <a:schemeClr val="accent1"/>
+          </a:fillRef>
+          <a:effectRef idx="0">
+            <a:schemeClr val="accent1"/>
+          </a:effectRef>
+          <a:fontRef idx="minor">
+            <a:schemeClr val="lt1"/>
+          </a:fontRef>
+        </p:style>
+        <p:txBody>
+          <a:bodyPr rot="0" spcFirstLastPara="0" vertOverflow="overflow" horzOverflow="overflow" vert="horz" wrap="square" lIns="91440" tIns="45720" rIns="91440" bIns="45720" numCol="1" spcCol="0" rtlCol="0" fromWordArt="0" anchor="ctr" anchorCtr="0" forceAA="0" compatLnSpc="1">
+            <a:prstTxWarp prst="textNoShape">
+              <a:avLst/>
+            </a:prstTxWarp>
+            <a:noAutofit/>
+          </a:bodyPr>
+          <a:lstStyle/>
+          <a:p>
+            <a:pPr algn="ctr"/>
+            <a:endParaRPr lang="en-GB"/>
+          </a:p>
+        </p:txBody>
+      </p:sp>
+      <p:sp>
+        <p:nvSpPr>
+          <p:cNvPr id="16" name="Rectangle: Rounded Corners 15">
+            <a:extLst>
+              <a:ext uri="{FF2B5EF4-FFF2-40B4-BE49-F238E27FC236}">
+                <a16:creationId xmlns:a16="http://schemas.microsoft.com/office/drawing/2014/main" id="{B5428A5F-2ECE-47BA-AD55-A7EBE94B66FC}"/>
+              </a:ext>
+            </a:extLst>
+          </p:cNvPr>
+          <p:cNvSpPr/>
+          <p:nvPr/>
+        </p:nvSpPr>
+        <p:spPr>
+          <a:xfrm>
+            <a:off x="946037" y="3619892"/>
+            <a:ext cx="1342994" cy="933253"/>
+          </a:xfrm>
+          <a:prstGeom prst="roundRect">
+            <a:avLst/>
+          </a:prstGeom>
+        </p:spPr>
+        <p:style>
+          <a:lnRef idx="2">
+            <a:schemeClr val="accent1">
+              <a:shade val="50000"/>
+            </a:schemeClr>
+          </a:lnRef>
+          <a:fillRef idx="1">
+            <a:schemeClr val="accent1"/>
+          </a:fillRef>
+          <a:effectRef idx="0">
+            <a:schemeClr val="accent1"/>
+          </a:effectRef>
+          <a:fontRef idx="minor">
+            <a:schemeClr val="lt1"/>
+          </a:fontRef>
+        </p:style>
+        <p:txBody>
+          <a:bodyPr rtlCol="0" anchor="ctr"/>
+          <a:lstStyle/>
+          <a:p>
+            <a:pPr algn="ctr"/>
+            <a:r>
+              <a:rPr lang="en-GB" sz="1200" dirty="0"/>
+              <a:t>Collection area: list of all elements of a particular type</a:t>
+            </a:r>
+          </a:p>
+        </p:txBody>
+      </p:sp>
+      <p:sp>
+        <p:nvSpPr>
+          <p:cNvPr id="18" name="Rectangle: Rounded Corners 17">
+            <a:extLst>
+              <a:ext uri="{FF2B5EF4-FFF2-40B4-BE49-F238E27FC236}">
+                <a16:creationId xmlns:a16="http://schemas.microsoft.com/office/drawing/2014/main" id="{D9B9D26C-D4F7-4FEE-83B8-6D21BED78C86}"/>
+              </a:ext>
+            </a:extLst>
+          </p:cNvPr>
+          <p:cNvSpPr/>
+          <p:nvPr/>
+        </p:nvSpPr>
+        <p:spPr>
+          <a:xfrm>
+            <a:off x="5424503" y="3619892"/>
+            <a:ext cx="2390318" cy="933253"/>
+          </a:xfrm>
+          <a:prstGeom prst="roundRect">
+            <a:avLst/>
+          </a:prstGeom>
+        </p:spPr>
+        <p:style>
+          <a:lnRef idx="2">
+            <a:schemeClr val="accent1">
+              <a:shade val="50000"/>
+            </a:schemeClr>
+          </a:lnRef>
+          <a:fillRef idx="1">
+            <a:schemeClr val="accent1"/>
+          </a:fillRef>
+          <a:effectRef idx="0">
+            <a:schemeClr val="accent1"/>
+          </a:effectRef>
+          <a:fontRef idx="minor">
+            <a:schemeClr val="lt1"/>
+          </a:fontRef>
+        </p:style>
+        <p:txBody>
+          <a:bodyPr rtlCol="0" anchor="ctr"/>
+          <a:lstStyle/>
+          <a:p>
+            <a:pPr algn="ctr"/>
+            <a:r>
+              <a:rPr lang="en-GB" sz="1200" dirty="0"/>
+              <a:t>Working area: main activities happen here (editing a Catalogue, running a cohort builder, etc.)</a:t>
+            </a:r>
+          </a:p>
+        </p:txBody>
+      </p:sp>
+    </p:spTree>
+    <p:extLst>
+      <p:ext uri="{BB962C8B-B14F-4D97-AF65-F5344CB8AC3E}">
+        <p14:creationId xmlns:p14="http://schemas.microsoft.com/office/powerpoint/2010/main" val="2574987240"/>
+      </p:ext>
+    </p:extLst>
+  </p:cSld>
+  <p:clrMapOvr>
+    <a:masterClrMapping/>
+  </p:clrMapOvr>
+  <p:timing>
+    <p:tnLst>
+      <p:par>
+        <p:cTn id="1" dur="indefinite" restart="never" nodeType="tmRoot">
+          <p:childTnLst>
+            <p:seq concurrent="1" nextAc="seek">
+              <p:cTn id="2" dur="indefinite" nodeType="mainSeq">
+                <p:childTnLst>
+                  <p:par>
+                    <p:cTn id="3" fill="hold">
+                      <p:stCondLst>
+                        <p:cond delay="indefinite"/>
+                      </p:stCondLst>
+                      <p:childTnLst>
+                        <p:par>
+                          <p:cTn id="4" fill="hold">
+                            <p:stCondLst>
+                              <p:cond delay="0"/>
+                            </p:stCondLst>
+                            <p:childTnLst>
+                              <p:par>
+                                <p:cTn id="5" presetID="10" presetClass="entr" presetSubtype="0" fill="hold" grpId="0" nodeType="clickEffect">
+                                  <p:stCondLst>
+                                    <p:cond delay="0"/>
+                                  </p:stCondLst>
+                                  <p:childTnLst>
+                                    <p:set>
+                                      <p:cBhvr>
+                                        <p:cTn id="6" dur="1" fill="hold">
+                                          <p:stCondLst>
+                                            <p:cond delay="0"/>
+                                          </p:stCondLst>
+                                        </p:cTn>
+                                        <p:tgtEl>
+                                          <p:spTgt spid="10"/>
+                                        </p:tgtEl>
+                                        <p:attrNameLst>
+                                          <p:attrName>style.visibility</p:attrName>
+                                        </p:attrNameLst>
+                                      </p:cBhvr>
+                                      <p:to>
+                                        <p:strVal val="visible"/>
+                                      </p:to>
+                                    </p:set>
+                                    <p:animEffect transition="in" filter="fade">
+                                      <p:cBhvr>
+                                        <p:cTn id="7" dur="500"/>
+                                        <p:tgtEl>
+                                          <p:spTgt spid="10"/>
+                                        </p:tgtEl>
+                                      </p:cBhvr>
+                                    </p:animEffect>
+                                  </p:childTnLst>
+                                </p:cTn>
+                              </p:par>
+                              <p:par>
+                                <p:cTn id="8" presetID="10" presetClass="entr" presetSubtype="0" fill="hold" nodeType="withEffect">
+                                  <p:stCondLst>
+                                    <p:cond delay="0"/>
+                                  </p:stCondLst>
+                                  <p:childTnLst>
+                                    <p:set>
+                                      <p:cBhvr>
+                                        <p:cTn id="9" dur="1" fill="hold">
+                                          <p:stCondLst>
+                                            <p:cond delay="0"/>
+                                          </p:stCondLst>
+                                        </p:cTn>
+                                        <p:tgtEl>
+                                          <p:spTgt spid="5"/>
+                                        </p:tgtEl>
+                                        <p:attrNameLst>
+                                          <p:attrName>style.visibility</p:attrName>
+                                        </p:attrNameLst>
+                                      </p:cBhvr>
+                                      <p:to>
+                                        <p:strVal val="visible"/>
+                                      </p:to>
+                                    </p:set>
+                                    <p:animEffect transition="in" filter="fade">
+                                      <p:cBhvr>
+                                        <p:cTn id="10" dur="500"/>
+                                        <p:tgtEl>
+                                          <p:spTgt spid="5"/>
+                                        </p:tgtEl>
+                                      </p:cBhvr>
+                                    </p:animEffect>
+                                  </p:childTnLst>
+                                </p:cTn>
+                              </p:par>
+                            </p:childTnLst>
+                          </p:cTn>
+                        </p:par>
+                      </p:childTnLst>
+                    </p:cTn>
+                  </p:par>
+                  <p:par>
+                    <p:cTn id="11" fill="hold">
+                      <p:stCondLst>
+                        <p:cond delay="indefinite"/>
+                      </p:stCondLst>
+                      <p:childTnLst>
+                        <p:par>
+                          <p:cTn id="12" fill="hold">
+                            <p:stCondLst>
+                              <p:cond delay="0"/>
+                            </p:stCondLst>
+                            <p:childTnLst>
+                              <p:par>
+                                <p:cTn id="13" presetID="10" presetClass="entr" presetSubtype="0" fill="hold" grpId="0" nodeType="clickEffect">
+                                  <p:stCondLst>
+                                    <p:cond delay="0"/>
+                                  </p:stCondLst>
+                                  <p:childTnLst>
+                                    <p:set>
+                                      <p:cBhvr>
+                                        <p:cTn id="14" dur="1" fill="hold">
+                                          <p:stCondLst>
+                                            <p:cond delay="0"/>
+                                          </p:stCondLst>
+                                        </p:cTn>
+                                        <p:tgtEl>
+                                          <p:spTgt spid="11"/>
+                                        </p:tgtEl>
+                                        <p:attrNameLst>
+                                          <p:attrName>style.visibility</p:attrName>
+                                        </p:attrNameLst>
+                                      </p:cBhvr>
+                                      <p:to>
+                                        <p:strVal val="visible"/>
+                                      </p:to>
+                                    </p:set>
+                                    <p:animEffect transition="in" filter="fade">
+                                      <p:cBhvr>
+                                        <p:cTn id="15" dur="500"/>
+                                        <p:tgtEl>
+                                          <p:spTgt spid="11"/>
+                                        </p:tgtEl>
+                                      </p:cBhvr>
+                                    </p:animEffect>
+                                  </p:childTnLst>
+                                </p:cTn>
+                              </p:par>
+                              <p:par>
+                                <p:cTn id="16" presetID="10" presetClass="entr" presetSubtype="0" fill="hold" grpId="0" nodeType="withEffect">
+                                  <p:stCondLst>
+                                    <p:cond delay="0"/>
+                                  </p:stCondLst>
+                                  <p:childTnLst>
+                                    <p:set>
+                                      <p:cBhvr>
+                                        <p:cTn id="17" dur="1" fill="hold">
+                                          <p:stCondLst>
+                                            <p:cond delay="0"/>
+                                          </p:stCondLst>
+                                        </p:cTn>
+                                        <p:tgtEl>
+                                          <p:spTgt spid="16"/>
+                                        </p:tgtEl>
+                                        <p:attrNameLst>
+                                          <p:attrName>style.visibility</p:attrName>
+                                        </p:attrNameLst>
+                                      </p:cBhvr>
+                                      <p:to>
+                                        <p:strVal val="visible"/>
+                                      </p:to>
+                                    </p:set>
+                                    <p:animEffect transition="in" filter="fade">
+                                      <p:cBhvr>
+                                        <p:cTn id="18" dur="500"/>
+                                        <p:tgtEl>
+                                          <p:spTgt spid="16"/>
+                                        </p:tgtEl>
+                                      </p:cBhvr>
+                                    </p:animEffect>
+                                  </p:childTnLst>
+                                </p:cTn>
+                              </p:par>
+                            </p:childTnLst>
+                          </p:cTn>
+                        </p:par>
+                      </p:childTnLst>
+                    </p:cTn>
+                  </p:par>
+                  <p:par>
+                    <p:cTn id="19" fill="hold">
+                      <p:stCondLst>
+                        <p:cond delay="indefinite"/>
+                      </p:stCondLst>
+                      <p:childTnLst>
+                        <p:par>
+                          <p:cTn id="20" fill="hold">
+                            <p:stCondLst>
+                              <p:cond delay="0"/>
+                            </p:stCondLst>
+                            <p:childTnLst>
+                              <p:par>
+                                <p:cTn id="21" presetID="10" presetClass="entr" presetSubtype="0" fill="hold" grpId="0" nodeType="clickEffect">
+                                  <p:stCondLst>
+                                    <p:cond delay="0"/>
+                                  </p:stCondLst>
+                                  <p:childTnLst>
+                                    <p:set>
+                                      <p:cBhvr>
+                                        <p:cTn id="22" dur="1" fill="hold">
+                                          <p:stCondLst>
+                                            <p:cond delay="0"/>
+                                          </p:stCondLst>
+                                        </p:cTn>
+                                        <p:tgtEl>
+                                          <p:spTgt spid="12"/>
+                                        </p:tgtEl>
+                                        <p:attrNameLst>
+                                          <p:attrName>style.visibility</p:attrName>
+                                        </p:attrNameLst>
+                                      </p:cBhvr>
+                                      <p:to>
+                                        <p:strVal val="visible"/>
+                                      </p:to>
+                                    </p:set>
+                                    <p:animEffect transition="in" filter="fade">
+                                      <p:cBhvr>
+                                        <p:cTn id="23" dur="500"/>
+                                        <p:tgtEl>
+                                          <p:spTgt spid="12"/>
+                                        </p:tgtEl>
+                                      </p:cBhvr>
+                                    </p:animEffect>
+                                  </p:childTnLst>
+                                </p:cTn>
+                              </p:par>
+                              <p:par>
+                                <p:cTn id="24" presetID="10" presetClass="entr" presetSubtype="0" fill="hold" grpId="0" nodeType="withEffect">
+                                  <p:stCondLst>
+                                    <p:cond delay="0"/>
+                                  </p:stCondLst>
+                                  <p:childTnLst>
+                                    <p:set>
+                                      <p:cBhvr>
+                                        <p:cTn id="25" dur="1" fill="hold">
+                                          <p:stCondLst>
+                                            <p:cond delay="0"/>
+                                          </p:stCondLst>
+                                        </p:cTn>
+                                        <p:tgtEl>
+                                          <p:spTgt spid="18"/>
+                                        </p:tgtEl>
+                                        <p:attrNameLst>
+                                          <p:attrName>style.visibility</p:attrName>
+                                        </p:attrNameLst>
+                                      </p:cBhvr>
+                                      <p:to>
+                                        <p:strVal val="visible"/>
+                                      </p:to>
+                                    </p:set>
+                                    <p:animEffect transition="in" filter="fade">
+                                      <p:cBhvr>
+                                        <p:cTn id="26" dur="500"/>
+                                        <p:tgtEl>
+                                          <p:spTgt spid="18"/>
+                                        </p:tgtEl>
+                                      </p:cBhvr>
+                                    </p:animEffect>
+                                  </p:childTnLst>
+                                </p:cTn>
+                              </p:par>
+                            </p:childTnLst>
+                          </p:cTn>
+                        </p:par>
+                      </p:childTnLst>
+                    </p:cTn>
+                  </p:par>
+                </p:childTnLst>
+              </p:cTn>
+              <p:prevCondLst>
+                <p:cond evt="onPrev" delay="0">
+                  <p:tgtEl>
+                    <p:sldTgt/>
+                  </p:tgtEl>
+                </p:cond>
+              </p:prevCondLst>
+              <p:nextCondLst>
+                <p:cond evt="onNext" delay="0">
+                  <p:tgtEl>
+                    <p:sldTgt/>
+                  </p:tgtEl>
+                </p:cond>
+              </p:nextCondLst>
+            </p:seq>
+          </p:childTnLst>
+        </p:cTn>
+      </p:par>
+    </p:tnLst>
+    <p:bldLst>
+      <p:bldP spid="10" grpId="0" animBg="1"/>
+      <p:bldP spid="11" grpId="0" animBg="1"/>
+      <p:bldP spid="12" grpId="0" animBg="1"/>
+      <p:bldP spid="16" grpId="0" animBg="1"/>
+      <p:bldP spid="18" grpId="0" animBg="1"/>
+    </p:bldLst>
+  </p:timing>
+</p:sld>
+</file>
+
+<file path=ppt/slides/slide3.xml><?xml version="1.0" encoding="utf-8"?>
+<p:sld xmlns:a="http://schemas.openxmlformats.org/drawingml/2006/main" xmlns:r="http://schemas.openxmlformats.org/officeDocument/2006/relationships" xmlns:p="http://schemas.openxmlformats.org/presentationml/2006/main">
+  <p:cSld>
+    <p:spTree>
+      <p:nvGrpSpPr>
+        <p:cNvPr id="1" name=""/>
+        <p:cNvGrpSpPr/>
+        <p:nvPr/>
+      </p:nvGrpSpPr>
+      <p:grpSpPr>
+        <a:xfrm>
+          <a:off x="0" y="0"/>
+          <a:ext cx="0" cy="0"/>
+          <a:chOff x="0" y="0"/>
+          <a:chExt cx="0" cy="0"/>
+        </a:xfrm>
+      </p:grpSpPr>
+      <p:sp>
+        <p:nvSpPr>
+          <p:cNvPr id="2" name="Title 1">
+            <a:extLst>
+              <a:ext uri="{FF2B5EF4-FFF2-40B4-BE49-F238E27FC236}">
                 <a16:creationId xmlns:a16="http://schemas.microsoft.com/office/drawing/2014/main" id="{DAB9B4C4-8F6E-4CC9-9CBC-6CA69BD3089C}"/>
               </a:ext>
             </a:extLst>
@@ -4564,10 +5335,326 @@
   <p:clrMapOvr>
     <a:masterClrMapping/>
   </p:clrMapOvr>
+  <p:timing>
+    <p:tnLst>
+      <p:par>
+        <p:cTn id="1" dur="indefinite" restart="never" nodeType="tmRoot">
+          <p:childTnLst>
+            <p:seq concurrent="1" nextAc="seek">
+              <p:cTn id="2" dur="indefinite" nodeType="mainSeq">
+                <p:childTnLst>
+                  <p:par>
+                    <p:cTn id="3" fill="hold">
+                      <p:stCondLst>
+                        <p:cond delay="indefinite"/>
+                      </p:stCondLst>
+                      <p:childTnLst>
+                        <p:par>
+                          <p:cTn id="4" fill="hold">
+                            <p:stCondLst>
+                              <p:cond delay="0"/>
+                            </p:stCondLst>
+                            <p:childTnLst>
+                              <p:par>
+                                <p:cTn id="5" presetID="10" presetClass="entr" presetSubtype="0" fill="hold" nodeType="clickEffect">
+                                  <p:stCondLst>
+                                    <p:cond delay="0"/>
+                                  </p:stCondLst>
+                                  <p:childTnLst>
+                                    <p:set>
+                                      <p:cBhvr>
+                                        <p:cTn id="6" dur="1" fill="hold">
+                                          <p:stCondLst>
+                                            <p:cond delay="0"/>
+                                          </p:stCondLst>
+                                        </p:cTn>
+                                        <p:tgtEl>
+                                          <p:spTgt spid="19"/>
+                                        </p:tgtEl>
+                                        <p:attrNameLst>
+                                          <p:attrName>style.visibility</p:attrName>
+                                        </p:attrNameLst>
+                                      </p:cBhvr>
+                                      <p:to>
+                                        <p:strVal val="visible"/>
+                                      </p:to>
+                                    </p:set>
+                                    <p:animEffect transition="in" filter="fade">
+                                      <p:cBhvr>
+                                        <p:cTn id="7" dur="500"/>
+                                        <p:tgtEl>
+                                          <p:spTgt spid="19"/>
+                                        </p:tgtEl>
+                                      </p:cBhvr>
+                                    </p:animEffect>
+                                  </p:childTnLst>
+                                </p:cTn>
+                              </p:par>
+                            </p:childTnLst>
+                          </p:cTn>
+                        </p:par>
+                      </p:childTnLst>
+                    </p:cTn>
+                  </p:par>
+                  <p:par>
+                    <p:cTn id="8" fill="hold">
+                      <p:stCondLst>
+                        <p:cond delay="indefinite"/>
+                      </p:stCondLst>
+                      <p:childTnLst>
+                        <p:par>
+                          <p:cTn id="9" fill="hold">
+                            <p:stCondLst>
+                              <p:cond delay="0"/>
+                            </p:stCondLst>
+                            <p:childTnLst>
+                              <p:par>
+                                <p:cTn id="10" presetID="10" presetClass="entr" presetSubtype="0" fill="hold" grpId="0" nodeType="clickEffect">
+                                  <p:stCondLst>
+                                    <p:cond delay="0"/>
+                                  </p:stCondLst>
+                                  <p:childTnLst>
+                                    <p:set>
+                                      <p:cBhvr>
+                                        <p:cTn id="11" dur="1" fill="hold">
+                                          <p:stCondLst>
+                                            <p:cond delay="0"/>
+                                          </p:stCondLst>
+                                        </p:cTn>
+                                        <p:tgtEl>
+                                          <p:spTgt spid="27"/>
+                                        </p:tgtEl>
+                                        <p:attrNameLst>
+                                          <p:attrName>style.visibility</p:attrName>
+                                        </p:attrNameLst>
+                                      </p:cBhvr>
+                                      <p:to>
+                                        <p:strVal val="visible"/>
+                                      </p:to>
+                                    </p:set>
+                                    <p:animEffect transition="in" filter="fade">
+                                      <p:cBhvr>
+                                        <p:cTn id="12" dur="500"/>
+                                        <p:tgtEl>
+                                          <p:spTgt spid="27"/>
+                                        </p:tgtEl>
+                                      </p:cBhvr>
+                                    </p:animEffect>
+                                  </p:childTnLst>
+                                </p:cTn>
+                              </p:par>
+                              <p:par>
+                                <p:cTn id="13" presetID="10" presetClass="entr" presetSubtype="0" fill="hold" nodeType="withEffect">
+                                  <p:stCondLst>
+                                    <p:cond delay="0"/>
+                                  </p:stCondLst>
+                                  <p:childTnLst>
+                                    <p:set>
+                                      <p:cBhvr>
+                                        <p:cTn id="14" dur="1" fill="hold">
+                                          <p:stCondLst>
+                                            <p:cond delay="0"/>
+                                          </p:stCondLst>
+                                        </p:cTn>
+                                        <p:tgtEl>
+                                          <p:spTgt spid="24"/>
+                                        </p:tgtEl>
+                                        <p:attrNameLst>
+                                          <p:attrName>style.visibility</p:attrName>
+                                        </p:attrNameLst>
+                                      </p:cBhvr>
+                                      <p:to>
+                                        <p:strVal val="visible"/>
+                                      </p:to>
+                                    </p:set>
+                                    <p:animEffect transition="in" filter="fade">
+                                      <p:cBhvr>
+                                        <p:cTn id="15" dur="500"/>
+                                        <p:tgtEl>
+                                          <p:spTgt spid="24"/>
+                                        </p:tgtEl>
+                                      </p:cBhvr>
+                                    </p:animEffect>
+                                  </p:childTnLst>
+                                </p:cTn>
+                              </p:par>
+                            </p:childTnLst>
+                          </p:cTn>
+                        </p:par>
+                      </p:childTnLst>
+                    </p:cTn>
+                  </p:par>
+                  <p:par>
+                    <p:cTn id="16" fill="hold">
+                      <p:stCondLst>
+                        <p:cond delay="indefinite"/>
+                      </p:stCondLst>
+                      <p:childTnLst>
+                        <p:par>
+                          <p:cTn id="17" fill="hold">
+                            <p:stCondLst>
+                              <p:cond delay="0"/>
+                            </p:stCondLst>
+                            <p:childTnLst>
+                              <p:par>
+                                <p:cTn id="18" presetID="10" presetClass="entr" presetSubtype="0" fill="hold" nodeType="clickEffect">
+                                  <p:stCondLst>
+                                    <p:cond delay="0"/>
+                                  </p:stCondLst>
+                                  <p:childTnLst>
+                                    <p:set>
+                                      <p:cBhvr>
+                                        <p:cTn id="19" dur="1" fill="hold">
+                                          <p:stCondLst>
+                                            <p:cond delay="0"/>
+                                          </p:stCondLst>
+                                        </p:cTn>
+                                        <p:tgtEl>
+                                          <p:spTgt spid="30"/>
+                                        </p:tgtEl>
+                                        <p:attrNameLst>
+                                          <p:attrName>style.visibility</p:attrName>
+                                        </p:attrNameLst>
+                                      </p:cBhvr>
+                                      <p:to>
+                                        <p:strVal val="visible"/>
+                                      </p:to>
+                                    </p:set>
+                                    <p:animEffect transition="in" filter="fade">
+                                      <p:cBhvr>
+                                        <p:cTn id="20" dur="500"/>
+                                        <p:tgtEl>
+                                          <p:spTgt spid="30"/>
+                                        </p:tgtEl>
+                                      </p:cBhvr>
+                                    </p:animEffect>
+                                  </p:childTnLst>
+                                </p:cTn>
+                              </p:par>
+                              <p:par>
+                                <p:cTn id="21" presetID="10" presetClass="entr" presetSubtype="0" fill="hold" grpId="0" nodeType="withEffect">
+                                  <p:stCondLst>
+                                    <p:cond delay="0"/>
+                                  </p:stCondLst>
+                                  <p:childTnLst>
+                                    <p:set>
+                                      <p:cBhvr>
+                                        <p:cTn id="22" dur="1" fill="hold">
+                                          <p:stCondLst>
+                                            <p:cond delay="0"/>
+                                          </p:stCondLst>
+                                        </p:cTn>
+                                        <p:tgtEl>
+                                          <p:spTgt spid="33"/>
+                                        </p:tgtEl>
+                                        <p:attrNameLst>
+                                          <p:attrName>style.visibility</p:attrName>
+                                        </p:attrNameLst>
+                                      </p:cBhvr>
+                                      <p:to>
+                                        <p:strVal val="visible"/>
+                                      </p:to>
+                                    </p:set>
+                                    <p:animEffect transition="in" filter="fade">
+                                      <p:cBhvr>
+                                        <p:cTn id="23" dur="500"/>
+                                        <p:tgtEl>
+                                          <p:spTgt spid="33"/>
+                                        </p:tgtEl>
+                                      </p:cBhvr>
+                                    </p:animEffect>
+                                  </p:childTnLst>
+                                </p:cTn>
+                              </p:par>
+                            </p:childTnLst>
+                          </p:cTn>
+                        </p:par>
+                      </p:childTnLst>
+                    </p:cTn>
+                  </p:par>
+                  <p:par>
+                    <p:cTn id="24" fill="hold">
+                      <p:stCondLst>
+                        <p:cond delay="indefinite"/>
+                      </p:stCondLst>
+                      <p:childTnLst>
+                        <p:par>
+                          <p:cTn id="25" fill="hold">
+                            <p:stCondLst>
+                              <p:cond delay="0"/>
+                            </p:stCondLst>
+                            <p:childTnLst>
+                              <p:par>
+                                <p:cTn id="26" presetID="10" presetClass="entr" presetSubtype="0" fill="hold" nodeType="clickEffect">
+                                  <p:stCondLst>
+                                    <p:cond delay="0"/>
+                                  </p:stCondLst>
+                                  <p:childTnLst>
+                                    <p:set>
+                                      <p:cBhvr>
+                                        <p:cTn id="27" dur="1" fill="hold">
+                                          <p:stCondLst>
+                                            <p:cond delay="0"/>
+                                          </p:stCondLst>
+                                        </p:cTn>
+                                        <p:tgtEl>
+                                          <p:spTgt spid="41"/>
+                                        </p:tgtEl>
+                                        <p:attrNameLst>
+                                          <p:attrName>style.visibility</p:attrName>
+                                        </p:attrNameLst>
+                                      </p:cBhvr>
+                                      <p:to>
+                                        <p:strVal val="visible"/>
+                                      </p:to>
+                                    </p:set>
+                                    <p:animEffect transition="in" filter="fade">
+                                      <p:cBhvr>
+                                        <p:cTn id="28" dur="500"/>
+                                        <p:tgtEl>
+                                          <p:spTgt spid="41"/>
+                                        </p:tgtEl>
+                                      </p:cBhvr>
+                                    </p:animEffect>
+                                  </p:childTnLst>
+                                </p:cTn>
+                              </p:par>
+                            </p:childTnLst>
+                          </p:cTn>
+                        </p:par>
+                      </p:childTnLst>
+                    </p:cTn>
+                  </p:par>
+                </p:childTnLst>
+              </p:cTn>
+              <p:prevCondLst>
+                <p:cond evt="onPrev" delay="0">
+                  <p:tgtEl>
+                    <p:sldTgt/>
+                  </p:tgtEl>
+                </p:cond>
+              </p:prevCondLst>
+              <p:nextCondLst>
+                <p:cond evt="onNext" delay="0">
+                  <p:tgtEl>
+                    <p:sldTgt/>
+                  </p:tgtEl>
+                </p:cond>
+              </p:nextCondLst>
+            </p:seq>
+          </p:childTnLst>
+        </p:cTn>
+      </p:par>
+    </p:tnLst>
+    <p:bldLst>
+      <p:bldP spid="27" grpId="0" animBg="1"/>
+      <p:bldP spid="33" grpId="0" animBg="1"/>
+    </p:bldLst>
+  </p:timing>
 </p:sld>
 </file>
 
-<file path=ppt/slides/slide3.xml><?xml version="1.0" encoding="utf-8"?>
+<file path=ppt/slides/slide4.xml><?xml version="1.0" encoding="utf-8"?>
 <p:sld xmlns:a="http://schemas.openxmlformats.org/drawingml/2006/main" xmlns:r="http://schemas.openxmlformats.org/officeDocument/2006/relationships" xmlns:p="http://schemas.openxmlformats.org/presentationml/2006/main">
   <p:cSld>
     <p:spTree>
@@ -4655,7 +5742,7 @@
 </p:sld>
 </file>
 
-<file path=ppt/slides/slide4.xml><?xml version="1.0" encoding="utf-8"?>
+<file path=ppt/slides/slide5.xml><?xml version="1.0" encoding="utf-8"?>
 <p:sld xmlns:a="http://schemas.openxmlformats.org/drawingml/2006/main" xmlns:r="http://schemas.openxmlformats.org/officeDocument/2006/relationships" xmlns:p="http://schemas.openxmlformats.org/presentationml/2006/main">
   <p:cSld>
     <p:spTree>
@@ -5032,10 +6119,146 @@
   <p:clrMapOvr>
     <a:masterClrMapping/>
   </p:clrMapOvr>
+  <p:timing>
+    <p:tnLst>
+      <p:par>
+        <p:cTn id="1" dur="indefinite" restart="never" nodeType="tmRoot">
+          <p:childTnLst>
+            <p:seq concurrent="1" nextAc="seek">
+              <p:cTn id="2" dur="indefinite" nodeType="mainSeq">
+                <p:childTnLst>
+                  <p:par>
+                    <p:cTn id="3" fill="hold">
+                      <p:stCondLst>
+                        <p:cond delay="indefinite"/>
+                      </p:stCondLst>
+                      <p:childTnLst>
+                        <p:par>
+                          <p:cTn id="4" fill="hold">
+                            <p:stCondLst>
+                              <p:cond delay="0"/>
+                            </p:stCondLst>
+                            <p:childTnLst>
+                              <p:par>
+                                <p:cTn id="5" presetID="10" presetClass="entr" presetSubtype="0" fill="hold" nodeType="clickEffect">
+                                  <p:stCondLst>
+                                    <p:cond delay="0"/>
+                                  </p:stCondLst>
+                                  <p:childTnLst>
+                                    <p:set>
+                                      <p:cBhvr>
+                                        <p:cTn id="6" dur="1" fill="hold">
+                                          <p:stCondLst>
+                                            <p:cond delay="0"/>
+                                          </p:stCondLst>
+                                        </p:cTn>
+                                        <p:tgtEl>
+                                          <p:spTgt spid="4"/>
+                                        </p:tgtEl>
+                                        <p:attrNameLst>
+                                          <p:attrName>style.visibility</p:attrName>
+                                        </p:attrNameLst>
+                                      </p:cBhvr>
+                                      <p:to>
+                                        <p:strVal val="visible"/>
+                                      </p:to>
+                                    </p:set>
+                                    <p:animEffect transition="in" filter="fade">
+                                      <p:cBhvr>
+                                        <p:cTn id="7" dur="500"/>
+                                        <p:tgtEl>
+                                          <p:spTgt spid="4"/>
+                                        </p:tgtEl>
+                                      </p:cBhvr>
+                                    </p:animEffect>
+                                  </p:childTnLst>
+                                </p:cTn>
+                              </p:par>
+                            </p:childTnLst>
+                          </p:cTn>
+                        </p:par>
+                      </p:childTnLst>
+                    </p:cTn>
+                  </p:par>
+                  <p:par>
+                    <p:cTn id="8" fill="hold">
+                      <p:stCondLst>
+                        <p:cond delay="indefinite"/>
+                      </p:stCondLst>
+                      <p:childTnLst>
+                        <p:par>
+                          <p:cTn id="9" fill="hold">
+                            <p:stCondLst>
+                              <p:cond delay="0"/>
+                            </p:stCondLst>
+                            <p:childTnLst>
+                              <p:par>
+                                <p:cTn id="10" presetID="10" presetClass="entr" presetSubtype="0" fill="hold" nodeType="clickEffect">
+                                  <p:stCondLst>
+                                    <p:cond delay="0"/>
+                                  </p:stCondLst>
+                                  <p:childTnLst>
+                                    <p:set>
+                                      <p:cBhvr>
+                                        <p:cTn id="11" dur="1" fill="hold">
+                                          <p:stCondLst>
+                                            <p:cond delay="0"/>
+                                          </p:stCondLst>
+                                        </p:cTn>
+                                        <p:tgtEl>
+                                          <p:spTgt spid="11"/>
+                                        </p:tgtEl>
+                                        <p:attrNameLst>
+                                          <p:attrName>style.visibility</p:attrName>
+                                        </p:attrNameLst>
+                                      </p:cBhvr>
+                                      <p:to>
+                                        <p:strVal val="visible"/>
+                                      </p:to>
+                                    </p:set>
+                                    <p:animEffect transition="in" filter="fade">
+                                      <p:cBhvr>
+                                        <p:cTn id="12" dur="500"/>
+                                        <p:tgtEl>
+                                          <p:spTgt spid="11"/>
+                                        </p:tgtEl>
+                                      </p:cBhvr>
+                                    </p:animEffect>
+                                  </p:childTnLst>
+                                </p:cTn>
+                              </p:par>
+                            </p:childTnLst>
+                          </p:cTn>
+                        </p:par>
+                      </p:childTnLst>
+                    </p:cTn>
+                  </p:par>
+                </p:childTnLst>
+              </p:cTn>
+              <p:prevCondLst>
+                <p:cond evt="onPrev" delay="0">
+                  <p:tgtEl>
+                    <p:sldTgt/>
+                  </p:tgtEl>
+                </p:cond>
+              </p:prevCondLst>
+              <p:nextCondLst>
+                <p:cond evt="onNext" delay="0">
+                  <p:tgtEl>
+                    <p:sldTgt/>
+                  </p:tgtEl>
+                </p:cond>
+              </p:nextCondLst>
+            </p:seq>
+          </p:childTnLst>
+        </p:cTn>
+      </p:par>
+    </p:tnLst>
+  </p:timing>
 </p:sld>
 </file>
 
-<file path=ppt/slides/slide5.xml><?xml version="1.0" encoding="utf-8"?>
+<file path=ppt/slides/slide6.xml><?xml version="1.0" encoding="utf-8"?>
 <p:sld xmlns:a="http://schemas.openxmlformats.org/drawingml/2006/main" xmlns:r="http://schemas.openxmlformats.org/officeDocument/2006/relationships" xmlns:p="http://schemas.openxmlformats.org/presentationml/2006/main">
   <p:cSld>
     <p:spTree>
@@ -5532,10 +6755,305 @@
   <p:clrMapOvr>
     <a:masterClrMapping/>
   </p:clrMapOvr>
+  <p:timing>
+    <p:tnLst>
+      <p:par>
+        <p:cTn id="1" dur="indefinite" restart="never" nodeType="tmRoot">
+          <p:childTnLst>
+            <p:seq concurrent="1" nextAc="seek">
+              <p:cTn id="2" dur="indefinite" nodeType="mainSeq">
+                <p:childTnLst>
+                  <p:par>
+                    <p:cTn id="3" fill="hold">
+                      <p:stCondLst>
+                        <p:cond delay="indefinite"/>
+                      </p:stCondLst>
+                      <p:childTnLst>
+                        <p:par>
+                          <p:cTn id="4" fill="hold">
+                            <p:stCondLst>
+                              <p:cond delay="0"/>
+                            </p:stCondLst>
+                            <p:childTnLst>
+                              <p:par>
+                                <p:cTn id="5" presetID="10" presetClass="entr" presetSubtype="0" fill="hold" nodeType="clickEffect">
+                                  <p:stCondLst>
+                                    <p:cond delay="0"/>
+                                  </p:stCondLst>
+                                  <p:childTnLst>
+                                    <p:set>
+                                      <p:cBhvr>
+                                        <p:cTn id="6" dur="1" fill="hold">
+                                          <p:stCondLst>
+                                            <p:cond delay="0"/>
+                                          </p:stCondLst>
+                                        </p:cTn>
+                                        <p:tgtEl>
+                                          <p:spTgt spid="4"/>
+                                        </p:tgtEl>
+                                        <p:attrNameLst>
+                                          <p:attrName>style.visibility</p:attrName>
+                                        </p:attrNameLst>
+                                      </p:cBhvr>
+                                      <p:to>
+                                        <p:strVal val="visible"/>
+                                      </p:to>
+                                    </p:set>
+                                    <p:animEffect transition="in" filter="fade">
+                                      <p:cBhvr>
+                                        <p:cTn id="7" dur="500"/>
+                                        <p:tgtEl>
+                                          <p:spTgt spid="4"/>
+                                        </p:tgtEl>
+                                      </p:cBhvr>
+                                    </p:animEffect>
+                                  </p:childTnLst>
+                                </p:cTn>
+                              </p:par>
+                            </p:childTnLst>
+                          </p:cTn>
+                        </p:par>
+                      </p:childTnLst>
+                    </p:cTn>
+                  </p:par>
+                  <p:par>
+                    <p:cTn id="8" fill="hold">
+                      <p:stCondLst>
+                        <p:cond delay="indefinite"/>
+                      </p:stCondLst>
+                      <p:childTnLst>
+                        <p:par>
+                          <p:cTn id="9" fill="hold">
+                            <p:stCondLst>
+                              <p:cond delay="0"/>
+                            </p:stCondLst>
+                            <p:childTnLst>
+                              <p:par>
+                                <p:cTn id="10" presetID="10" presetClass="entr" presetSubtype="0" fill="hold" nodeType="clickEffect">
+                                  <p:stCondLst>
+                                    <p:cond delay="0"/>
+                                  </p:stCondLst>
+                                  <p:childTnLst>
+                                    <p:set>
+                                      <p:cBhvr>
+                                        <p:cTn id="11" dur="1" fill="hold">
+                                          <p:stCondLst>
+                                            <p:cond delay="0"/>
+                                          </p:stCondLst>
+                                        </p:cTn>
+                                        <p:tgtEl>
+                                          <p:spTgt spid="17"/>
+                                        </p:tgtEl>
+                                        <p:attrNameLst>
+                                          <p:attrName>style.visibility</p:attrName>
+                                        </p:attrNameLst>
+                                      </p:cBhvr>
+                                      <p:to>
+                                        <p:strVal val="visible"/>
+                                      </p:to>
+                                    </p:set>
+                                    <p:animEffect transition="in" filter="fade">
+                                      <p:cBhvr>
+                                        <p:cTn id="12" dur="500"/>
+                                        <p:tgtEl>
+                                          <p:spTgt spid="17"/>
+                                        </p:tgtEl>
+                                      </p:cBhvr>
+                                    </p:animEffect>
+                                  </p:childTnLst>
+                                </p:cTn>
+                              </p:par>
+                            </p:childTnLst>
+                          </p:cTn>
+                        </p:par>
+                      </p:childTnLst>
+                    </p:cTn>
+                  </p:par>
+                  <p:par>
+                    <p:cTn id="13" fill="hold">
+                      <p:stCondLst>
+                        <p:cond delay="indefinite"/>
+                      </p:stCondLst>
+                      <p:childTnLst>
+                        <p:par>
+                          <p:cTn id="14" fill="hold">
+                            <p:stCondLst>
+                              <p:cond delay="0"/>
+                            </p:stCondLst>
+                            <p:childTnLst>
+                              <p:par>
+                                <p:cTn id="15" presetID="10" presetClass="entr" presetSubtype="0" fill="hold" nodeType="clickEffect">
+                                  <p:stCondLst>
+                                    <p:cond delay="0"/>
+                                  </p:stCondLst>
+                                  <p:childTnLst>
+                                    <p:set>
+                                      <p:cBhvr>
+                                        <p:cTn id="16" dur="1" fill="hold">
+                                          <p:stCondLst>
+                                            <p:cond delay="0"/>
+                                          </p:stCondLst>
+                                        </p:cTn>
+                                        <p:tgtEl>
+                                          <p:spTgt spid="16"/>
+                                        </p:tgtEl>
+                                        <p:attrNameLst>
+                                          <p:attrName>style.visibility</p:attrName>
+                                        </p:attrNameLst>
+                                      </p:cBhvr>
+                                      <p:to>
+                                        <p:strVal val="visible"/>
+                                      </p:to>
+                                    </p:set>
+                                    <p:animEffect transition="in" filter="fade">
+                                      <p:cBhvr>
+                                        <p:cTn id="17" dur="500"/>
+                                        <p:tgtEl>
+                                          <p:spTgt spid="16"/>
+                                        </p:tgtEl>
+                                      </p:cBhvr>
+                                    </p:animEffect>
+                                  </p:childTnLst>
+                                </p:cTn>
+                              </p:par>
+                            </p:childTnLst>
+                          </p:cTn>
+                        </p:par>
+                      </p:childTnLst>
+                    </p:cTn>
+                  </p:par>
+                  <p:par>
+                    <p:cTn id="18" fill="hold">
+                      <p:stCondLst>
+                        <p:cond delay="indefinite"/>
+                      </p:stCondLst>
+                      <p:childTnLst>
+                        <p:par>
+                          <p:cTn id="19" fill="hold">
+                            <p:stCondLst>
+                              <p:cond delay="0"/>
+                            </p:stCondLst>
+                            <p:childTnLst>
+                              <p:par>
+                                <p:cTn id="20" presetID="10" presetClass="entr" presetSubtype="0" fill="hold" nodeType="clickEffect">
+                                  <p:stCondLst>
+                                    <p:cond delay="0"/>
+                                  </p:stCondLst>
+                                  <p:childTnLst>
+                                    <p:set>
+                                      <p:cBhvr>
+                                        <p:cTn id="21" dur="1" fill="hold">
+                                          <p:stCondLst>
+                                            <p:cond delay="0"/>
+                                          </p:stCondLst>
+                                        </p:cTn>
+                                        <p:tgtEl>
+                                          <p:spTgt spid="21"/>
+                                        </p:tgtEl>
+                                        <p:attrNameLst>
+                                          <p:attrName>style.visibility</p:attrName>
+                                        </p:attrNameLst>
+                                      </p:cBhvr>
+                                      <p:to>
+                                        <p:strVal val="visible"/>
+                                      </p:to>
+                                    </p:set>
+                                    <p:animEffect transition="in" filter="fade">
+                                      <p:cBhvr>
+                                        <p:cTn id="22" dur="500"/>
+                                        <p:tgtEl>
+                                          <p:spTgt spid="21"/>
+                                        </p:tgtEl>
+                                      </p:cBhvr>
+                                    </p:animEffect>
+                                  </p:childTnLst>
+                                </p:cTn>
+                              </p:par>
+                            </p:childTnLst>
+                          </p:cTn>
+                        </p:par>
+                      </p:childTnLst>
+                    </p:cTn>
+                  </p:par>
+                  <p:par>
+                    <p:cTn id="23" fill="hold">
+                      <p:stCondLst>
+                        <p:cond delay="indefinite"/>
+                      </p:stCondLst>
+                      <p:childTnLst>
+                        <p:par>
+                          <p:cTn id="24" fill="hold">
+                            <p:stCondLst>
+                              <p:cond delay="0"/>
+                            </p:stCondLst>
+                            <p:childTnLst>
+                              <p:par>
+                                <p:cTn id="25" presetID="10" presetClass="entr" presetSubtype="0" fill="hold" nodeType="clickEffect">
+                                  <p:stCondLst>
+                                    <p:cond delay="0"/>
+                                  </p:stCondLst>
+                                  <p:childTnLst>
+                                    <p:set>
+                                      <p:cBhvr>
+                                        <p:cTn id="26" dur="1" fill="hold">
+                                          <p:stCondLst>
+                                            <p:cond delay="0"/>
+                                          </p:stCondLst>
+                                        </p:cTn>
+                                        <p:tgtEl>
+                                          <p:spTgt spid="26"/>
+                                        </p:tgtEl>
+                                        <p:attrNameLst>
+                                          <p:attrName>style.visibility</p:attrName>
+                                        </p:attrNameLst>
+                                      </p:cBhvr>
+                                      <p:to>
+                                        <p:strVal val="visible"/>
+                                      </p:to>
+                                    </p:set>
+                                    <p:animEffect transition="in" filter="fade">
+                                      <p:cBhvr>
+                                        <p:cTn id="27" dur="500"/>
+                                        <p:tgtEl>
+                                          <p:spTgt spid="26"/>
+                                        </p:tgtEl>
+                                      </p:cBhvr>
+                                    </p:animEffect>
+                                  </p:childTnLst>
+                                </p:cTn>
+                              </p:par>
+                            </p:childTnLst>
+                          </p:cTn>
+                        </p:par>
+                      </p:childTnLst>
+                    </p:cTn>
+                  </p:par>
+                </p:childTnLst>
+              </p:cTn>
+              <p:prevCondLst>
+                <p:cond evt="onPrev" delay="0">
+                  <p:tgtEl>
+                    <p:sldTgt/>
+                  </p:tgtEl>
+                </p:cond>
+              </p:prevCondLst>
+              <p:nextCondLst>
+                <p:cond evt="onNext" delay="0">
+                  <p:tgtEl>
+                    <p:sldTgt/>
+                  </p:tgtEl>
+                </p:cond>
+              </p:nextCondLst>
+            </p:seq>
+          </p:childTnLst>
+        </p:cTn>
+      </p:par>
+    </p:tnLst>
+  </p:timing>
 </p:sld>
 </file>
 
-<file path=ppt/slides/slide6.xml><?xml version="1.0" encoding="utf-8"?>
+<file path=ppt/slides/slide7.xml><?xml version="1.0" encoding="utf-8"?>
 <p:sld xmlns:a="http://schemas.openxmlformats.org/drawingml/2006/main" xmlns:r="http://schemas.openxmlformats.org/officeDocument/2006/relationships" xmlns:p="http://schemas.openxmlformats.org/presentationml/2006/main">
   <p:cSld>
     <p:spTree>
@@ -6001,10 +7519,252 @@
   <p:clrMapOvr>
     <a:masterClrMapping/>
   </p:clrMapOvr>
+  <p:timing>
+    <p:tnLst>
+      <p:par>
+        <p:cTn id="1" dur="indefinite" restart="never" nodeType="tmRoot">
+          <p:childTnLst>
+            <p:seq concurrent="1" nextAc="seek">
+              <p:cTn id="2" dur="indefinite" nodeType="mainSeq">
+                <p:childTnLst>
+                  <p:par>
+                    <p:cTn id="3" fill="hold">
+                      <p:stCondLst>
+                        <p:cond delay="indefinite"/>
+                      </p:stCondLst>
+                      <p:childTnLst>
+                        <p:par>
+                          <p:cTn id="4" fill="hold">
+                            <p:stCondLst>
+                              <p:cond delay="0"/>
+                            </p:stCondLst>
+                            <p:childTnLst>
+                              <p:par>
+                                <p:cTn id="5" presetID="10" presetClass="entr" presetSubtype="0" fill="hold" nodeType="clickEffect">
+                                  <p:stCondLst>
+                                    <p:cond delay="0"/>
+                                  </p:stCondLst>
+                                  <p:childTnLst>
+                                    <p:set>
+                                      <p:cBhvr>
+                                        <p:cTn id="6" dur="1" fill="hold">
+                                          <p:stCondLst>
+                                            <p:cond delay="0"/>
+                                          </p:stCondLst>
+                                        </p:cTn>
+                                        <p:tgtEl>
+                                          <p:spTgt spid="33"/>
+                                        </p:tgtEl>
+                                        <p:attrNameLst>
+                                          <p:attrName>style.visibility</p:attrName>
+                                        </p:attrNameLst>
+                                      </p:cBhvr>
+                                      <p:to>
+                                        <p:strVal val="visible"/>
+                                      </p:to>
+                                    </p:set>
+                                    <p:animEffect transition="in" filter="fade">
+                                      <p:cBhvr>
+                                        <p:cTn id="7" dur="500"/>
+                                        <p:tgtEl>
+                                          <p:spTgt spid="33"/>
+                                        </p:tgtEl>
+                                      </p:cBhvr>
+                                    </p:animEffect>
+                                  </p:childTnLst>
+                                </p:cTn>
+                              </p:par>
+                            </p:childTnLst>
+                          </p:cTn>
+                        </p:par>
+                      </p:childTnLst>
+                    </p:cTn>
+                  </p:par>
+                  <p:par>
+                    <p:cTn id="8" fill="hold">
+                      <p:stCondLst>
+                        <p:cond delay="indefinite"/>
+                      </p:stCondLst>
+                      <p:childTnLst>
+                        <p:par>
+                          <p:cTn id="9" fill="hold">
+                            <p:stCondLst>
+                              <p:cond delay="0"/>
+                            </p:stCondLst>
+                            <p:childTnLst>
+                              <p:par>
+                                <p:cTn id="10" presetID="10" presetClass="entr" presetSubtype="0" fill="hold" nodeType="clickEffect">
+                                  <p:stCondLst>
+                                    <p:cond delay="0"/>
+                                  </p:stCondLst>
+                                  <p:childTnLst>
+                                    <p:set>
+                                      <p:cBhvr>
+                                        <p:cTn id="11" dur="1" fill="hold">
+                                          <p:stCondLst>
+                                            <p:cond delay="0"/>
+                                          </p:stCondLst>
+                                        </p:cTn>
+                                        <p:tgtEl>
+                                          <p:spTgt spid="21"/>
+                                        </p:tgtEl>
+                                        <p:attrNameLst>
+                                          <p:attrName>style.visibility</p:attrName>
+                                        </p:attrNameLst>
+                                      </p:cBhvr>
+                                      <p:to>
+                                        <p:strVal val="visible"/>
+                                      </p:to>
+                                    </p:set>
+                                    <p:animEffect transition="in" filter="fade">
+                                      <p:cBhvr>
+                                        <p:cTn id="12" dur="500"/>
+                                        <p:tgtEl>
+                                          <p:spTgt spid="21"/>
+                                        </p:tgtEl>
+                                      </p:cBhvr>
+                                    </p:animEffect>
+                                  </p:childTnLst>
+                                </p:cTn>
+                              </p:par>
+                            </p:childTnLst>
+                          </p:cTn>
+                        </p:par>
+                      </p:childTnLst>
+                    </p:cTn>
+                  </p:par>
+                  <p:par>
+                    <p:cTn id="13" fill="hold">
+                      <p:stCondLst>
+                        <p:cond delay="indefinite"/>
+                      </p:stCondLst>
+                      <p:childTnLst>
+                        <p:par>
+                          <p:cTn id="14" fill="hold">
+                            <p:stCondLst>
+                              <p:cond delay="0"/>
+                            </p:stCondLst>
+                            <p:childTnLst>
+                              <p:par>
+                                <p:cTn id="15" presetID="10" presetClass="entr" presetSubtype="0" fill="hold" nodeType="clickEffect">
+                                  <p:stCondLst>
+                                    <p:cond delay="0"/>
+                                  </p:stCondLst>
+                                  <p:childTnLst>
+                                    <p:set>
+                                      <p:cBhvr>
+                                        <p:cTn id="16" dur="1" fill="hold">
+                                          <p:stCondLst>
+                                            <p:cond delay="0"/>
+                                          </p:stCondLst>
+                                        </p:cTn>
+                                        <p:tgtEl>
+                                          <p:spTgt spid="24"/>
+                                        </p:tgtEl>
+                                        <p:attrNameLst>
+                                          <p:attrName>style.visibility</p:attrName>
+                                        </p:attrNameLst>
+                                      </p:cBhvr>
+                                      <p:to>
+                                        <p:strVal val="visible"/>
+                                      </p:to>
+                                    </p:set>
+                                    <p:animEffect transition="in" filter="fade">
+                                      <p:cBhvr>
+                                        <p:cTn id="17" dur="500"/>
+                                        <p:tgtEl>
+                                          <p:spTgt spid="24"/>
+                                        </p:tgtEl>
+                                      </p:cBhvr>
+                                    </p:animEffect>
+                                  </p:childTnLst>
+                                </p:cTn>
+                              </p:par>
+                            </p:childTnLst>
+                          </p:cTn>
+                        </p:par>
+                      </p:childTnLst>
+                    </p:cTn>
+                  </p:par>
+                  <p:par>
+                    <p:cTn id="18" fill="hold">
+                      <p:stCondLst>
+                        <p:cond delay="indefinite"/>
+                      </p:stCondLst>
+                      <p:childTnLst>
+                        <p:par>
+                          <p:cTn id="19" fill="hold">
+                            <p:stCondLst>
+                              <p:cond delay="0"/>
+                            </p:stCondLst>
+                            <p:childTnLst>
+                              <p:par>
+                                <p:cTn id="20" presetID="10" presetClass="entr" presetSubtype="0" fill="hold" nodeType="clickEffect">
+                                  <p:stCondLst>
+                                    <p:cond delay="0"/>
+                                  </p:stCondLst>
+                                  <p:childTnLst>
+                                    <p:set>
+                                      <p:cBhvr>
+                                        <p:cTn id="21" dur="1" fill="hold">
+                                          <p:stCondLst>
+                                            <p:cond delay="0"/>
+                                          </p:stCondLst>
+                                        </p:cTn>
+                                        <p:tgtEl>
+                                          <p:spTgt spid="35"/>
+                                        </p:tgtEl>
+                                        <p:attrNameLst>
+                                          <p:attrName>style.visibility</p:attrName>
+                                        </p:attrNameLst>
+                                      </p:cBhvr>
+                                      <p:to>
+                                        <p:strVal val="visible"/>
+                                      </p:to>
+                                    </p:set>
+                                    <p:animEffect transition="in" filter="fade">
+                                      <p:cBhvr>
+                                        <p:cTn id="22" dur="500"/>
+                                        <p:tgtEl>
+                                          <p:spTgt spid="35"/>
+                                        </p:tgtEl>
+                                      </p:cBhvr>
+                                    </p:animEffect>
+                                  </p:childTnLst>
+                                </p:cTn>
+                              </p:par>
+                            </p:childTnLst>
+                          </p:cTn>
+                        </p:par>
+                      </p:childTnLst>
+                    </p:cTn>
+                  </p:par>
+                </p:childTnLst>
+              </p:cTn>
+              <p:prevCondLst>
+                <p:cond evt="onPrev" delay="0">
+                  <p:tgtEl>
+                    <p:sldTgt/>
+                  </p:tgtEl>
+                </p:cond>
+              </p:prevCondLst>
+              <p:nextCondLst>
+                <p:cond evt="onNext" delay="0">
+                  <p:tgtEl>
+                    <p:sldTgt/>
+                  </p:tgtEl>
+                </p:cond>
+              </p:nextCondLst>
+            </p:seq>
+          </p:childTnLst>
+        </p:cTn>
+      </p:par>
+    </p:tnLst>
+  </p:timing>
 </p:sld>
 </file>
 
-<file path=ppt/slides/slide7.xml><?xml version="1.0" encoding="utf-8"?>
+<file path=ppt/slides/slide8.xml><?xml version="1.0" encoding="utf-8"?>
 <p:sld xmlns:a="http://schemas.openxmlformats.org/drawingml/2006/main" xmlns:r="http://schemas.openxmlformats.org/officeDocument/2006/relationships" xmlns:p="http://schemas.openxmlformats.org/presentationml/2006/main">
   <p:cSld>
     <p:spTree>
@@ -6497,10 +8257,305 @@
   <p:clrMapOvr>
     <a:masterClrMapping/>
   </p:clrMapOvr>
+  <p:timing>
+    <p:tnLst>
+      <p:par>
+        <p:cTn id="1" dur="indefinite" restart="never" nodeType="tmRoot">
+          <p:childTnLst>
+            <p:seq concurrent="1" nextAc="seek">
+              <p:cTn id="2" dur="indefinite" nodeType="mainSeq">
+                <p:childTnLst>
+                  <p:par>
+                    <p:cTn id="3" fill="hold">
+                      <p:stCondLst>
+                        <p:cond delay="indefinite"/>
+                      </p:stCondLst>
+                      <p:childTnLst>
+                        <p:par>
+                          <p:cTn id="4" fill="hold">
+                            <p:stCondLst>
+                              <p:cond delay="0"/>
+                            </p:stCondLst>
+                            <p:childTnLst>
+                              <p:par>
+                                <p:cTn id="5" presetID="10" presetClass="entr" presetSubtype="0" fill="hold" nodeType="clickEffect">
+                                  <p:stCondLst>
+                                    <p:cond delay="0"/>
+                                  </p:stCondLst>
+                                  <p:childTnLst>
+                                    <p:set>
+                                      <p:cBhvr>
+                                        <p:cTn id="6" dur="1" fill="hold">
+                                          <p:stCondLst>
+                                            <p:cond delay="0"/>
+                                          </p:stCondLst>
+                                        </p:cTn>
+                                        <p:tgtEl>
+                                          <p:spTgt spid="35"/>
+                                        </p:tgtEl>
+                                        <p:attrNameLst>
+                                          <p:attrName>style.visibility</p:attrName>
+                                        </p:attrNameLst>
+                                      </p:cBhvr>
+                                      <p:to>
+                                        <p:strVal val="visible"/>
+                                      </p:to>
+                                    </p:set>
+                                    <p:animEffect transition="in" filter="fade">
+                                      <p:cBhvr>
+                                        <p:cTn id="7" dur="500"/>
+                                        <p:tgtEl>
+                                          <p:spTgt spid="35"/>
+                                        </p:tgtEl>
+                                      </p:cBhvr>
+                                    </p:animEffect>
+                                  </p:childTnLst>
+                                </p:cTn>
+                              </p:par>
+                            </p:childTnLst>
+                          </p:cTn>
+                        </p:par>
+                      </p:childTnLst>
+                    </p:cTn>
+                  </p:par>
+                  <p:par>
+                    <p:cTn id="8" fill="hold">
+                      <p:stCondLst>
+                        <p:cond delay="indefinite"/>
+                      </p:stCondLst>
+                      <p:childTnLst>
+                        <p:par>
+                          <p:cTn id="9" fill="hold">
+                            <p:stCondLst>
+                              <p:cond delay="0"/>
+                            </p:stCondLst>
+                            <p:childTnLst>
+                              <p:par>
+                                <p:cTn id="10" presetID="10" presetClass="entr" presetSubtype="0" fill="hold" nodeType="clickEffect">
+                                  <p:stCondLst>
+                                    <p:cond delay="0"/>
+                                  </p:stCondLst>
+                                  <p:childTnLst>
+                                    <p:set>
+                                      <p:cBhvr>
+                                        <p:cTn id="11" dur="1" fill="hold">
+                                          <p:stCondLst>
+                                            <p:cond delay="0"/>
+                                          </p:stCondLst>
+                                        </p:cTn>
+                                        <p:tgtEl>
+                                          <p:spTgt spid="9"/>
+                                        </p:tgtEl>
+                                        <p:attrNameLst>
+                                          <p:attrName>style.visibility</p:attrName>
+                                        </p:attrNameLst>
+                                      </p:cBhvr>
+                                      <p:to>
+                                        <p:strVal val="visible"/>
+                                      </p:to>
+                                    </p:set>
+                                    <p:animEffect transition="in" filter="fade">
+                                      <p:cBhvr>
+                                        <p:cTn id="12" dur="500"/>
+                                        <p:tgtEl>
+                                          <p:spTgt spid="9"/>
+                                        </p:tgtEl>
+                                      </p:cBhvr>
+                                    </p:animEffect>
+                                  </p:childTnLst>
+                                </p:cTn>
+                              </p:par>
+                            </p:childTnLst>
+                          </p:cTn>
+                        </p:par>
+                      </p:childTnLst>
+                    </p:cTn>
+                  </p:par>
+                  <p:par>
+                    <p:cTn id="13" fill="hold">
+                      <p:stCondLst>
+                        <p:cond delay="indefinite"/>
+                      </p:stCondLst>
+                      <p:childTnLst>
+                        <p:par>
+                          <p:cTn id="14" fill="hold">
+                            <p:stCondLst>
+                              <p:cond delay="0"/>
+                            </p:stCondLst>
+                            <p:childTnLst>
+                              <p:par>
+                                <p:cTn id="15" presetID="10" presetClass="entr" presetSubtype="0" fill="hold" nodeType="clickEffect">
+                                  <p:stCondLst>
+                                    <p:cond delay="0"/>
+                                  </p:stCondLst>
+                                  <p:childTnLst>
+                                    <p:set>
+                                      <p:cBhvr>
+                                        <p:cTn id="16" dur="1" fill="hold">
+                                          <p:stCondLst>
+                                            <p:cond delay="0"/>
+                                          </p:stCondLst>
+                                        </p:cTn>
+                                        <p:tgtEl>
+                                          <p:spTgt spid="6"/>
+                                        </p:tgtEl>
+                                        <p:attrNameLst>
+                                          <p:attrName>style.visibility</p:attrName>
+                                        </p:attrNameLst>
+                                      </p:cBhvr>
+                                      <p:to>
+                                        <p:strVal val="visible"/>
+                                      </p:to>
+                                    </p:set>
+                                    <p:animEffect transition="in" filter="fade">
+                                      <p:cBhvr>
+                                        <p:cTn id="17" dur="500"/>
+                                        <p:tgtEl>
+                                          <p:spTgt spid="6"/>
+                                        </p:tgtEl>
+                                      </p:cBhvr>
+                                    </p:animEffect>
+                                  </p:childTnLst>
+                                </p:cTn>
+                              </p:par>
+                            </p:childTnLst>
+                          </p:cTn>
+                        </p:par>
+                      </p:childTnLst>
+                    </p:cTn>
+                  </p:par>
+                  <p:par>
+                    <p:cTn id="18" fill="hold">
+                      <p:stCondLst>
+                        <p:cond delay="indefinite"/>
+                      </p:stCondLst>
+                      <p:childTnLst>
+                        <p:par>
+                          <p:cTn id="19" fill="hold">
+                            <p:stCondLst>
+                              <p:cond delay="0"/>
+                            </p:stCondLst>
+                            <p:childTnLst>
+                              <p:par>
+                                <p:cTn id="20" presetID="10" presetClass="entr" presetSubtype="0" fill="hold" nodeType="clickEffect">
+                                  <p:stCondLst>
+                                    <p:cond delay="0"/>
+                                  </p:stCondLst>
+                                  <p:childTnLst>
+                                    <p:set>
+                                      <p:cBhvr>
+                                        <p:cTn id="21" dur="1" fill="hold">
+                                          <p:stCondLst>
+                                            <p:cond delay="0"/>
+                                          </p:stCondLst>
+                                        </p:cTn>
+                                        <p:tgtEl>
+                                          <p:spTgt spid="21"/>
+                                        </p:tgtEl>
+                                        <p:attrNameLst>
+                                          <p:attrName>style.visibility</p:attrName>
+                                        </p:attrNameLst>
+                                      </p:cBhvr>
+                                      <p:to>
+                                        <p:strVal val="visible"/>
+                                      </p:to>
+                                    </p:set>
+                                    <p:animEffect transition="in" filter="fade">
+                                      <p:cBhvr>
+                                        <p:cTn id="22" dur="500"/>
+                                        <p:tgtEl>
+                                          <p:spTgt spid="21"/>
+                                        </p:tgtEl>
+                                      </p:cBhvr>
+                                    </p:animEffect>
+                                  </p:childTnLst>
+                                </p:cTn>
+                              </p:par>
+                            </p:childTnLst>
+                          </p:cTn>
+                        </p:par>
+                      </p:childTnLst>
+                    </p:cTn>
+                  </p:par>
+                  <p:par>
+                    <p:cTn id="23" fill="hold">
+                      <p:stCondLst>
+                        <p:cond delay="indefinite"/>
+                      </p:stCondLst>
+                      <p:childTnLst>
+                        <p:par>
+                          <p:cTn id="24" fill="hold">
+                            <p:stCondLst>
+                              <p:cond delay="0"/>
+                            </p:stCondLst>
+                            <p:childTnLst>
+                              <p:par>
+                                <p:cTn id="25" presetID="10" presetClass="entr" presetSubtype="0" fill="hold" nodeType="clickEffect">
+                                  <p:stCondLst>
+                                    <p:cond delay="0"/>
+                                  </p:stCondLst>
+                                  <p:childTnLst>
+                                    <p:set>
+                                      <p:cBhvr>
+                                        <p:cTn id="26" dur="1" fill="hold">
+                                          <p:stCondLst>
+                                            <p:cond delay="0"/>
+                                          </p:stCondLst>
+                                        </p:cTn>
+                                        <p:tgtEl>
+                                          <p:spTgt spid="27"/>
+                                        </p:tgtEl>
+                                        <p:attrNameLst>
+                                          <p:attrName>style.visibility</p:attrName>
+                                        </p:attrNameLst>
+                                      </p:cBhvr>
+                                      <p:to>
+                                        <p:strVal val="visible"/>
+                                      </p:to>
+                                    </p:set>
+                                    <p:animEffect transition="in" filter="fade">
+                                      <p:cBhvr>
+                                        <p:cTn id="27" dur="500"/>
+                                        <p:tgtEl>
+                                          <p:spTgt spid="27"/>
+                                        </p:tgtEl>
+                                      </p:cBhvr>
+                                    </p:animEffect>
+                                  </p:childTnLst>
+                                </p:cTn>
+                              </p:par>
+                            </p:childTnLst>
+                          </p:cTn>
+                        </p:par>
+                      </p:childTnLst>
+                    </p:cTn>
+                  </p:par>
+                </p:childTnLst>
+              </p:cTn>
+              <p:prevCondLst>
+                <p:cond evt="onPrev" delay="0">
+                  <p:tgtEl>
+                    <p:sldTgt/>
+                  </p:tgtEl>
+                </p:cond>
+              </p:prevCondLst>
+              <p:nextCondLst>
+                <p:cond evt="onNext" delay="0">
+                  <p:tgtEl>
+                    <p:sldTgt/>
+                  </p:tgtEl>
+                </p:cond>
+              </p:nextCondLst>
+            </p:seq>
+          </p:childTnLst>
+        </p:cTn>
+      </p:par>
+    </p:tnLst>
+  </p:timing>
 </p:sld>
 </file>
 
-<file path=ppt/slides/slide8.xml><?xml version="1.0" encoding="utf-8"?>
+<file path=ppt/slides/slide9.xml><?xml version="1.0" encoding="utf-8"?>
 <p:sld xmlns:a="http://schemas.openxmlformats.org/drawingml/2006/main" xmlns:r="http://schemas.openxmlformats.org/officeDocument/2006/relationships" xmlns:p="http://schemas.openxmlformats.org/presentationml/2006/main">
   <p:cSld>
     <p:spTree>
@@ -6677,6 +8732,142 @@
   <p:clrMapOvr>
     <a:masterClrMapping/>
   </p:clrMapOvr>
+  <p:timing>
+    <p:tnLst>
+      <p:par>
+        <p:cTn id="1" dur="indefinite" restart="never" nodeType="tmRoot">
+          <p:childTnLst>
+            <p:seq concurrent="1" nextAc="seek">
+              <p:cTn id="2" dur="indefinite" nodeType="mainSeq">
+                <p:childTnLst>
+                  <p:par>
+                    <p:cTn id="3" fill="hold">
+                      <p:stCondLst>
+                        <p:cond delay="indefinite"/>
+                      </p:stCondLst>
+                      <p:childTnLst>
+                        <p:par>
+                          <p:cTn id="4" fill="hold">
+                            <p:stCondLst>
+                              <p:cond delay="0"/>
+                            </p:stCondLst>
+                            <p:childTnLst>
+                              <p:par>
+                                <p:cTn id="5" presetID="10" presetClass="entr" presetSubtype="0" fill="hold" nodeType="clickEffect">
+                                  <p:stCondLst>
+                                    <p:cond delay="0"/>
+                                  </p:stCondLst>
+                                  <p:childTnLst>
+                                    <p:set>
+                                      <p:cBhvr>
+                                        <p:cTn id="6" dur="1" fill="hold">
+                                          <p:stCondLst>
+                                            <p:cond delay="0"/>
+                                          </p:stCondLst>
+                                        </p:cTn>
+                                        <p:tgtEl>
+                                          <p:spTgt spid="14"/>
+                                        </p:tgtEl>
+                                        <p:attrNameLst>
+                                          <p:attrName>style.visibility</p:attrName>
+                                        </p:attrNameLst>
+                                      </p:cBhvr>
+                                      <p:to>
+                                        <p:strVal val="visible"/>
+                                      </p:to>
+                                    </p:set>
+                                    <p:animEffect transition="in" filter="fade">
+                                      <p:cBhvr>
+                                        <p:cTn id="7" dur="500"/>
+                                        <p:tgtEl>
+                                          <p:spTgt spid="14"/>
+                                        </p:tgtEl>
+                                      </p:cBhvr>
+                                    </p:animEffect>
+                                  </p:childTnLst>
+                                </p:cTn>
+                              </p:par>
+                            </p:childTnLst>
+                          </p:cTn>
+                        </p:par>
+                      </p:childTnLst>
+                    </p:cTn>
+                  </p:par>
+                  <p:par>
+                    <p:cTn id="8" fill="hold">
+                      <p:stCondLst>
+                        <p:cond delay="indefinite"/>
+                      </p:stCondLst>
+                      <p:childTnLst>
+                        <p:par>
+                          <p:cTn id="9" fill="hold">
+                            <p:stCondLst>
+                              <p:cond delay="0"/>
+                            </p:stCondLst>
+                            <p:childTnLst>
+                              <p:par>
+                                <p:cTn id="10" presetID="10" presetClass="entr" presetSubtype="0" fill="hold" nodeType="clickEffect">
+                                  <p:stCondLst>
+                                    <p:cond delay="0"/>
+                                  </p:stCondLst>
+                                  <p:childTnLst>
+                                    <p:set>
+                                      <p:cBhvr>
+                                        <p:cTn id="11" dur="1" fill="hold">
+                                          <p:stCondLst>
+                                            <p:cond delay="0"/>
+                                          </p:stCondLst>
+                                        </p:cTn>
+                                        <p:tgtEl>
+                                          <p:spTgt spid="3"/>
+                                        </p:tgtEl>
+                                        <p:attrNameLst>
+                                          <p:attrName>style.visibility</p:attrName>
+                                        </p:attrNameLst>
+                                      </p:cBhvr>
+                                      <p:to>
+                                        <p:strVal val="visible"/>
+                                      </p:to>
+                                    </p:set>
+                                    <p:animEffect transition="in" filter="fade">
+                                      <p:cBhvr>
+                                        <p:cTn id="12" dur="500"/>
+                                        <p:tgtEl>
+                                          <p:spTgt spid="3"/>
+                                        </p:tgtEl>
+                                      </p:cBhvr>
+                                    </p:animEffect>
+                                  </p:childTnLst>
+                                </p:cTn>
+                              </p:par>
+                            </p:childTnLst>
+                          </p:cTn>
+                        </p:par>
+                      </p:childTnLst>
+                    </p:cTn>
+                  </p:par>
+                </p:childTnLst>
+              </p:cTn>
+              <p:prevCondLst>
+                <p:cond evt="onPrev" delay="0">
+                  <p:tgtEl>
+                    <p:sldTgt/>
+                  </p:tgtEl>
+                </p:cond>
+              </p:prevCondLst>
+              <p:nextCondLst>
+                <p:cond evt="onNext" delay="0">
+                  <p:tgtEl>
+                    <p:sldTgt/>
+                  </p:tgtEl>
+                </p:cond>
+              </p:nextCondLst>
+            </p:seq>
+          </p:childTnLst>
+        </p:cTn>
+      </p:par>
+    </p:tnLst>
+  </p:timing>
 </p:sld>
 </file>
 

</xml_diff>

<commit_message>
Started some work on data extraction training
</commit_message>
<xml_diff>
--- a/Documentation/Training/MainUI.pptx
+++ b/Documentation/Training/MainUI.pptx
@@ -5,7 +5,7 @@
     <p:sldMasterId id="2147483648" r:id="rId1"/>
   </p:sldMasterIdLst>
   <p:notesMasterIdLst>
-    <p:notesMasterId r:id="rId11"/>
+    <p:notesMasterId r:id="rId12"/>
   </p:notesMasterIdLst>
   <p:sldIdLst>
     <p:sldId id="256" r:id="rId2"/>
@@ -17,6 +17,7 @@
     <p:sldId id="273" r:id="rId8"/>
     <p:sldId id="284" r:id="rId9"/>
     <p:sldId id="285" r:id="rId10"/>
+    <p:sldId id="287" r:id="rId11"/>
   </p:sldIdLst>
   <p:sldSz cx="12192000" cy="6858000"/>
   <p:notesSz cx="6858000" cy="9144000"/>
@@ -129,6 +130,7 @@
             <p14:sldId id="273"/>
             <p14:sldId id="284"/>
             <p14:sldId id="285"/>
+            <p14:sldId id="287"/>
           </p14:sldIdLst>
         </p14:section>
         <p14:section name="Simpler workthrough" id="{DBD142CE-6DD3-4D58-9A98-F12788E9E14C}">
@@ -3916,6 +3918,539 @@
 </p:sld>
 </file>
 
+<file path=ppt/slides/slide10.xml><?xml version="1.0" encoding="utf-8"?>
+<p:sld xmlns:a="http://schemas.openxmlformats.org/drawingml/2006/main" xmlns:r="http://schemas.openxmlformats.org/officeDocument/2006/relationships" xmlns:p="http://schemas.openxmlformats.org/presentationml/2006/main">
+  <p:cSld>
+    <p:spTree>
+      <p:nvGrpSpPr>
+        <p:cNvPr id="1" name=""/>
+        <p:cNvGrpSpPr/>
+        <p:nvPr/>
+      </p:nvGrpSpPr>
+      <p:grpSpPr>
+        <a:xfrm>
+          <a:off x="0" y="0"/>
+          <a:ext cx="0" cy="0"/>
+          <a:chOff x="0" y="0"/>
+          <a:chExt cx="0" cy="0"/>
+        </a:xfrm>
+      </p:grpSpPr>
+      <p:sp>
+        <p:nvSpPr>
+          <p:cNvPr id="2" name="Title 1">
+            <a:extLst>
+              <a:ext uri="{FF2B5EF4-FFF2-40B4-BE49-F238E27FC236}">
+                <a16:creationId xmlns:a16="http://schemas.microsoft.com/office/drawing/2014/main" id="{59781254-AD93-4CAB-B4CD-97B890E640F8}"/>
+              </a:ext>
+            </a:extLst>
+          </p:cNvPr>
+          <p:cNvSpPr>
+            <a:spLocks noGrp="1"/>
+          </p:cNvSpPr>
+          <p:nvPr>
+            <p:ph type="title"/>
+          </p:nvPr>
+        </p:nvSpPr>
+        <p:spPr/>
+        <p:txBody>
+          <a:bodyPr/>
+          <a:lstStyle/>
+          <a:p>
+            <a:r>
+              <a:rPr lang="en-GB" dirty="0"/>
+              <a:t>Context menu</a:t>
+            </a:r>
+          </a:p>
+        </p:txBody>
+      </p:sp>
+      <p:sp>
+        <p:nvSpPr>
+          <p:cNvPr id="3" name="Content Placeholder 2">
+            <a:extLst>
+              <a:ext uri="{FF2B5EF4-FFF2-40B4-BE49-F238E27FC236}">
+                <a16:creationId xmlns:a16="http://schemas.microsoft.com/office/drawing/2014/main" id="{D77DEB8A-7BBE-4513-88A5-B08A1D74A368}"/>
+              </a:ext>
+            </a:extLst>
+          </p:cNvPr>
+          <p:cNvSpPr>
+            <a:spLocks noGrp="1"/>
+          </p:cNvSpPr>
+          <p:nvPr>
+            <p:ph idx="1"/>
+          </p:nvPr>
+        </p:nvSpPr>
+        <p:spPr/>
+        <p:txBody>
+          <a:bodyPr/>
+          <a:lstStyle/>
+          <a:p>
+            <a:r>
+              <a:rPr lang="en-GB" dirty="0"/>
+              <a:t>You can “right click” on pretty much everything!</a:t>
+            </a:r>
+          </a:p>
+        </p:txBody>
+      </p:sp>
+      <p:grpSp>
+        <p:nvGrpSpPr>
+          <p:cNvPr id="10" name="Group 9">
+            <a:extLst>
+              <a:ext uri="{FF2B5EF4-FFF2-40B4-BE49-F238E27FC236}">
+                <a16:creationId xmlns:a16="http://schemas.microsoft.com/office/drawing/2014/main" id="{737327A6-9A45-4896-B3CD-50A0AE4842EA}"/>
+              </a:ext>
+            </a:extLst>
+          </p:cNvPr>
+          <p:cNvGrpSpPr/>
+          <p:nvPr/>
+        </p:nvGrpSpPr>
+        <p:grpSpPr>
+          <a:xfrm>
+            <a:off x="8201320" y="943863"/>
+            <a:ext cx="3441423" cy="2106303"/>
+            <a:chOff x="8201320" y="943863"/>
+            <a:chExt cx="3441423" cy="2106303"/>
+          </a:xfrm>
+        </p:grpSpPr>
+        <p:pic>
+          <p:nvPicPr>
+            <p:cNvPr id="4" name="Picture 3">
+              <a:extLst>
+                <a:ext uri="{FF2B5EF4-FFF2-40B4-BE49-F238E27FC236}">
+                  <a16:creationId xmlns:a16="http://schemas.microsoft.com/office/drawing/2014/main" id="{A14A0214-EBEC-4622-9EB2-9379FB8125DA}"/>
+                </a:ext>
+              </a:extLst>
+            </p:cNvPr>
+            <p:cNvPicPr>
+              <a:picLocks noChangeAspect="1"/>
+            </p:cNvPicPr>
+            <p:nvPr/>
+          </p:nvPicPr>
+          <p:blipFill>
+            <a:blip r:embed="rId2"/>
+            <a:stretch>
+              <a:fillRect/>
+            </a:stretch>
+          </p:blipFill>
+          <p:spPr>
+            <a:xfrm>
+              <a:off x="8213446" y="943863"/>
+              <a:ext cx="3429297" cy="1493649"/>
+            </a:xfrm>
+            <a:prstGeom prst="rect">
+              <a:avLst/>
+            </a:prstGeom>
+          </p:spPr>
+        </p:pic>
+        <p:sp>
+          <p:nvSpPr>
+            <p:cNvPr id="5" name="TextBox 4">
+              <a:extLst>
+                <a:ext uri="{FF2B5EF4-FFF2-40B4-BE49-F238E27FC236}">
+                  <a16:creationId xmlns:a16="http://schemas.microsoft.com/office/drawing/2014/main" id="{90124DB5-6DE1-4D18-95DD-8DA772C3B715}"/>
+                </a:ext>
+              </a:extLst>
+            </p:cNvPr>
+            <p:cNvSpPr txBox="1"/>
+            <p:nvPr/>
+          </p:nvSpPr>
+          <p:spPr>
+            <a:xfrm>
+              <a:off x="8201320" y="2403835"/>
+              <a:ext cx="3440783" cy="646331"/>
+            </a:xfrm>
+            <a:prstGeom prst="rect">
+              <a:avLst/>
+            </a:prstGeom>
+            <a:noFill/>
+          </p:spPr>
+          <p:txBody>
+            <a:bodyPr wrap="square" rtlCol="0">
+              <a:spAutoFit/>
+            </a:bodyPr>
+            <a:lstStyle/>
+            <a:p>
+              <a:r>
+                <a:rPr lang="en-GB" dirty="0"/>
+                <a:t>On empty space it will give most “Create…” options</a:t>
+              </a:r>
+            </a:p>
+          </p:txBody>
+        </p:sp>
+      </p:grpSp>
+      <p:grpSp>
+        <p:nvGrpSpPr>
+          <p:cNvPr id="11" name="Group 10">
+            <a:extLst>
+              <a:ext uri="{FF2B5EF4-FFF2-40B4-BE49-F238E27FC236}">
+                <a16:creationId xmlns:a16="http://schemas.microsoft.com/office/drawing/2014/main" id="{6205C6FF-9324-476B-8BFE-3E1123D30535}"/>
+              </a:ext>
+            </a:extLst>
+          </p:cNvPr>
+          <p:cNvGrpSpPr/>
+          <p:nvPr/>
+        </p:nvGrpSpPr>
+        <p:grpSpPr>
+          <a:xfrm>
+            <a:off x="6594048" y="3183870"/>
+            <a:ext cx="5406274" cy="3571303"/>
+            <a:chOff x="6594048" y="3183870"/>
+            <a:chExt cx="5406274" cy="3571303"/>
+          </a:xfrm>
+        </p:grpSpPr>
+        <p:pic>
+          <p:nvPicPr>
+            <p:cNvPr id="6" name="Picture 5">
+              <a:extLst>
+                <a:ext uri="{FF2B5EF4-FFF2-40B4-BE49-F238E27FC236}">
+                  <a16:creationId xmlns:a16="http://schemas.microsoft.com/office/drawing/2014/main" id="{045562A1-53C2-4409-873C-EA3B84094D36}"/>
+                </a:ext>
+              </a:extLst>
+            </p:cNvPr>
+            <p:cNvPicPr>
+              <a:picLocks noChangeAspect="1"/>
+            </p:cNvPicPr>
+            <p:nvPr/>
+          </p:nvPicPr>
+          <p:blipFill>
+            <a:blip r:embed="rId3"/>
+            <a:stretch>
+              <a:fillRect/>
+            </a:stretch>
+          </p:blipFill>
+          <p:spPr>
+            <a:xfrm>
+              <a:off x="6855084" y="3183870"/>
+              <a:ext cx="2918713" cy="3314987"/>
+            </a:xfrm>
+            <a:prstGeom prst="rect">
+              <a:avLst/>
+            </a:prstGeom>
+          </p:spPr>
+        </p:pic>
+        <p:sp>
+          <p:nvSpPr>
+            <p:cNvPr id="7" name="TextBox 6">
+              <a:extLst>
+                <a:ext uri="{FF2B5EF4-FFF2-40B4-BE49-F238E27FC236}">
+                  <a16:creationId xmlns:a16="http://schemas.microsoft.com/office/drawing/2014/main" id="{30A2FB41-49FE-4656-8C82-C59BBFB5D12B}"/>
+                </a:ext>
+              </a:extLst>
+            </p:cNvPr>
+            <p:cNvSpPr txBox="1"/>
+            <p:nvPr/>
+          </p:nvSpPr>
+          <p:spPr>
+            <a:xfrm>
+              <a:off x="6594048" y="6385841"/>
+              <a:ext cx="5406274" cy="369332"/>
+            </a:xfrm>
+            <a:prstGeom prst="rect">
+              <a:avLst/>
+            </a:prstGeom>
+            <a:noFill/>
+          </p:spPr>
+          <p:txBody>
+            <a:bodyPr wrap="square" rtlCol="0">
+              <a:spAutoFit/>
+            </a:bodyPr>
+            <a:lstStyle/>
+            <a:p>
+              <a:r>
+                <a:rPr lang="en-GB" dirty="0"/>
+                <a:t>On an object it will show the most useful related actions</a:t>
+              </a:r>
+            </a:p>
+          </p:txBody>
+        </p:sp>
+      </p:grpSp>
+      <p:grpSp>
+        <p:nvGrpSpPr>
+          <p:cNvPr id="12" name="Group 11">
+            <a:extLst>
+              <a:ext uri="{FF2B5EF4-FFF2-40B4-BE49-F238E27FC236}">
+                <a16:creationId xmlns:a16="http://schemas.microsoft.com/office/drawing/2014/main" id="{746DD5FD-D081-49BC-9968-63CEF453C17A}"/>
+              </a:ext>
+            </a:extLst>
+          </p:cNvPr>
+          <p:cNvGrpSpPr/>
+          <p:nvPr/>
+        </p:nvGrpSpPr>
+        <p:grpSpPr>
+          <a:xfrm>
+            <a:off x="1308115" y="2733353"/>
+            <a:ext cx="5054978" cy="3947879"/>
+            <a:chOff x="1308115" y="2733353"/>
+            <a:chExt cx="5054978" cy="3947879"/>
+          </a:xfrm>
+        </p:grpSpPr>
+        <p:pic>
+          <p:nvPicPr>
+            <p:cNvPr id="8" name="Picture 7">
+              <a:extLst>
+                <a:ext uri="{FF2B5EF4-FFF2-40B4-BE49-F238E27FC236}">
+                  <a16:creationId xmlns:a16="http://schemas.microsoft.com/office/drawing/2014/main" id="{FC037D38-2094-47A8-AE95-E7EB5E8AE854}"/>
+                </a:ext>
+              </a:extLst>
+            </p:cNvPr>
+            <p:cNvPicPr>
+              <a:picLocks noChangeAspect="1"/>
+            </p:cNvPicPr>
+            <p:nvPr/>
+          </p:nvPicPr>
+          <p:blipFill>
+            <a:blip r:embed="rId4"/>
+            <a:stretch>
+              <a:fillRect/>
+            </a:stretch>
+          </p:blipFill>
+          <p:spPr>
+            <a:xfrm>
+              <a:off x="1308115" y="2733353"/>
+              <a:ext cx="3848433" cy="3635055"/>
+            </a:xfrm>
+            <a:prstGeom prst="rect">
+              <a:avLst/>
+            </a:prstGeom>
+          </p:spPr>
+        </p:pic>
+        <p:sp>
+          <p:nvSpPr>
+            <p:cNvPr id="9" name="TextBox 8">
+              <a:extLst>
+                <a:ext uri="{FF2B5EF4-FFF2-40B4-BE49-F238E27FC236}">
+                  <a16:creationId xmlns:a16="http://schemas.microsoft.com/office/drawing/2014/main" id="{28BABBE7-03C3-46CA-9F2C-5027315BBAEC}"/>
+                </a:ext>
+              </a:extLst>
+            </p:cNvPr>
+            <p:cNvSpPr txBox="1"/>
+            <p:nvPr/>
+          </p:nvSpPr>
+          <p:spPr>
+            <a:xfrm>
+              <a:off x="1308115" y="6311900"/>
+              <a:ext cx="5054978" cy="369332"/>
+            </a:xfrm>
+            <a:prstGeom prst="rect">
+              <a:avLst/>
+            </a:prstGeom>
+            <a:noFill/>
+          </p:spPr>
+          <p:txBody>
+            <a:bodyPr wrap="square" rtlCol="0">
+              <a:spAutoFit/>
+            </a:bodyPr>
+            <a:lstStyle/>
+            <a:p>
+              <a:r>
+                <a:rPr lang="en-GB" dirty="0"/>
+                <a:t>If a command is greyed out, hover on it to see why!</a:t>
+              </a:r>
+            </a:p>
+          </p:txBody>
+        </p:sp>
+      </p:grpSp>
+    </p:spTree>
+    <p:extLst>
+      <p:ext uri="{BB962C8B-B14F-4D97-AF65-F5344CB8AC3E}">
+        <p14:creationId xmlns:p14="http://schemas.microsoft.com/office/powerpoint/2010/main" val="29529975"/>
+      </p:ext>
+    </p:extLst>
+  </p:cSld>
+  <p:clrMapOvr>
+    <a:masterClrMapping/>
+  </p:clrMapOvr>
+  <p:timing>
+    <p:tnLst>
+      <p:par>
+        <p:cTn id="1" dur="indefinite" restart="never" nodeType="tmRoot">
+          <p:childTnLst>
+            <p:seq concurrent="1" nextAc="seek">
+              <p:cTn id="2" dur="indefinite" nodeType="mainSeq">
+                <p:childTnLst>
+                  <p:par>
+                    <p:cTn id="3" fill="hold">
+                      <p:stCondLst>
+                        <p:cond delay="indefinite"/>
+                      </p:stCondLst>
+                      <p:childTnLst>
+                        <p:par>
+                          <p:cTn id="4" fill="hold">
+                            <p:stCondLst>
+                              <p:cond delay="0"/>
+                            </p:stCondLst>
+                            <p:childTnLst>
+                              <p:par>
+                                <p:cTn id="5" presetID="10" presetClass="entr" presetSubtype="0" fill="hold" nodeType="clickEffect">
+                                  <p:stCondLst>
+                                    <p:cond delay="0"/>
+                                  </p:stCondLst>
+                                  <p:childTnLst>
+                                    <p:set>
+                                      <p:cBhvr>
+                                        <p:cTn id="6" dur="1" fill="hold">
+                                          <p:stCondLst>
+                                            <p:cond delay="0"/>
+                                          </p:stCondLst>
+                                        </p:cTn>
+                                        <p:tgtEl>
+                                          <p:spTgt spid="10"/>
+                                        </p:tgtEl>
+                                        <p:attrNameLst>
+                                          <p:attrName>style.visibility</p:attrName>
+                                        </p:attrNameLst>
+                                      </p:cBhvr>
+                                      <p:to>
+                                        <p:strVal val="visible"/>
+                                      </p:to>
+                                    </p:set>
+                                    <p:animEffect transition="in" filter="fade">
+                                      <p:cBhvr>
+                                        <p:cTn id="7" dur="500"/>
+                                        <p:tgtEl>
+                                          <p:spTgt spid="10"/>
+                                        </p:tgtEl>
+                                      </p:cBhvr>
+                                    </p:animEffect>
+                                  </p:childTnLst>
+                                </p:cTn>
+                              </p:par>
+                            </p:childTnLst>
+                          </p:cTn>
+                        </p:par>
+                      </p:childTnLst>
+                    </p:cTn>
+                  </p:par>
+                  <p:par>
+                    <p:cTn id="8" fill="hold">
+                      <p:stCondLst>
+                        <p:cond delay="indefinite"/>
+                      </p:stCondLst>
+                      <p:childTnLst>
+                        <p:par>
+                          <p:cTn id="9" fill="hold">
+                            <p:stCondLst>
+                              <p:cond delay="0"/>
+                            </p:stCondLst>
+                            <p:childTnLst>
+                              <p:par>
+                                <p:cTn id="10" presetID="10" presetClass="entr" presetSubtype="0" fill="hold" nodeType="clickEffect">
+                                  <p:stCondLst>
+                                    <p:cond delay="0"/>
+                                  </p:stCondLst>
+                                  <p:childTnLst>
+                                    <p:set>
+                                      <p:cBhvr>
+                                        <p:cTn id="11" dur="1" fill="hold">
+                                          <p:stCondLst>
+                                            <p:cond delay="0"/>
+                                          </p:stCondLst>
+                                        </p:cTn>
+                                        <p:tgtEl>
+                                          <p:spTgt spid="11"/>
+                                        </p:tgtEl>
+                                        <p:attrNameLst>
+                                          <p:attrName>style.visibility</p:attrName>
+                                        </p:attrNameLst>
+                                      </p:cBhvr>
+                                      <p:to>
+                                        <p:strVal val="visible"/>
+                                      </p:to>
+                                    </p:set>
+                                    <p:animEffect transition="in" filter="fade">
+                                      <p:cBhvr>
+                                        <p:cTn id="12" dur="500"/>
+                                        <p:tgtEl>
+                                          <p:spTgt spid="11"/>
+                                        </p:tgtEl>
+                                      </p:cBhvr>
+                                    </p:animEffect>
+                                  </p:childTnLst>
+                                </p:cTn>
+                              </p:par>
+                            </p:childTnLst>
+                          </p:cTn>
+                        </p:par>
+                      </p:childTnLst>
+                    </p:cTn>
+                  </p:par>
+                  <p:par>
+                    <p:cTn id="13" fill="hold">
+                      <p:stCondLst>
+                        <p:cond delay="indefinite"/>
+                      </p:stCondLst>
+                      <p:childTnLst>
+                        <p:par>
+                          <p:cTn id="14" fill="hold">
+                            <p:stCondLst>
+                              <p:cond delay="0"/>
+                            </p:stCondLst>
+                            <p:childTnLst>
+                              <p:par>
+                                <p:cTn id="15" presetID="10" presetClass="entr" presetSubtype="0" fill="hold" nodeType="clickEffect">
+                                  <p:stCondLst>
+                                    <p:cond delay="0"/>
+                                  </p:stCondLst>
+                                  <p:childTnLst>
+                                    <p:set>
+                                      <p:cBhvr>
+                                        <p:cTn id="16" dur="1" fill="hold">
+                                          <p:stCondLst>
+                                            <p:cond delay="0"/>
+                                          </p:stCondLst>
+                                        </p:cTn>
+                                        <p:tgtEl>
+                                          <p:spTgt spid="12"/>
+                                        </p:tgtEl>
+                                        <p:attrNameLst>
+                                          <p:attrName>style.visibility</p:attrName>
+                                        </p:attrNameLst>
+                                      </p:cBhvr>
+                                      <p:to>
+                                        <p:strVal val="visible"/>
+                                      </p:to>
+                                    </p:set>
+                                    <p:animEffect transition="in" filter="fade">
+                                      <p:cBhvr>
+                                        <p:cTn id="17" dur="500"/>
+                                        <p:tgtEl>
+                                          <p:spTgt spid="12"/>
+                                        </p:tgtEl>
+                                      </p:cBhvr>
+                                    </p:animEffect>
+                                  </p:childTnLst>
+                                </p:cTn>
+                              </p:par>
+                            </p:childTnLst>
+                          </p:cTn>
+                        </p:par>
+                      </p:childTnLst>
+                    </p:cTn>
+                  </p:par>
+                </p:childTnLst>
+              </p:cTn>
+              <p:prevCondLst>
+                <p:cond evt="onPrev" delay="0">
+                  <p:tgtEl>
+                    <p:sldTgt/>
+                  </p:tgtEl>
+                </p:cond>
+              </p:prevCondLst>
+              <p:nextCondLst>
+                <p:cond evt="onNext" delay="0">
+                  <p:tgtEl>
+                    <p:sldTgt/>
+                  </p:tgtEl>
+                </p:cond>
+              </p:nextCondLst>
+            </p:seq>
+          </p:childTnLst>
+        </p:cTn>
+      </p:par>
+    </p:tnLst>
+  </p:timing>
+</p:sld>
+</file>
+
 <file path=ppt/slides/slide2.xml><?xml version="1.0" encoding="utf-8"?>
 <p:sld xmlns:a="http://schemas.openxmlformats.org/drawingml/2006/main" xmlns:r="http://schemas.openxmlformats.org/officeDocument/2006/relationships" xmlns:p="http://schemas.openxmlformats.org/presentationml/2006/main">
   <p:cSld>
@@ -4414,7 +4949,7 @@
                             </p:stCondLst>
                             <p:childTnLst>
                               <p:par>
-                                <p:cTn id="5" presetID="10" presetClass="entr" presetSubtype="0" fill="hold" grpId="0" nodeType="clickEffect">
+                                <p:cTn id="5" presetID="10" presetClass="entr" presetSubtype="0" fill="hold" nodeType="clickEffect">
                                   <p:stCondLst>
                                     <p:cond delay="0"/>
                                   </p:stCondLst>
@@ -4422,6 +4957,59 @@
                                     <p:set>
                                       <p:cBhvr>
                                         <p:cTn id="6" dur="1" fill="hold">
+                                          <p:stCondLst>
+                                            <p:cond delay="0"/>
+                                          </p:stCondLst>
+                                        </p:cTn>
+                                        <p:tgtEl>
+                                          <p:spTgt spid="4"/>
+                                        </p:tgtEl>
+                                        <p:attrNameLst>
+                                          <p:attrName>style.visibility</p:attrName>
+                                        </p:attrNameLst>
+                                      </p:cBhvr>
+                                      <p:to>
+                                        <p:strVal val="visible"/>
+                                      </p:to>
+                                    </p:set>
+                                    <p:animEffect transition="in" filter="fade">
+                                      <p:cBhvr>
+                                        <p:cTn id="7" dur="500"/>
+                                        <p:tgtEl>
+                                          <p:spTgt spid="4"/>
+                                        </p:tgtEl>
+                                      </p:cBhvr>
+                                    </p:animEffect>
+                                  </p:childTnLst>
+                                </p:cTn>
+                              </p:par>
+                            </p:childTnLst>
+                          </p:cTn>
+                        </p:par>
+                      </p:childTnLst>
+                    </p:cTn>
+                  </p:par>
+                  <p:par>
+                    <p:cTn id="8" fill="hold">
+                      <p:stCondLst>
+                        <p:cond delay="indefinite"/>
+                      </p:stCondLst>
+                      <p:childTnLst>
+                        <p:par>
+                          <p:cTn id="9" fill="hold">
+                            <p:stCondLst>
+                              <p:cond delay="0"/>
+                            </p:stCondLst>
+                            <p:childTnLst>
+                              <p:par>
+                                <p:cTn id="10" presetID="10" presetClass="entr" presetSubtype="0" fill="hold" grpId="0" nodeType="clickEffect">
+                                  <p:stCondLst>
+                                    <p:cond delay="0"/>
+                                  </p:stCondLst>
+                                  <p:childTnLst>
+                                    <p:set>
+                                      <p:cBhvr>
+                                        <p:cTn id="11" dur="1" fill="hold">
                                           <p:stCondLst>
                                             <p:cond delay="0"/>
                                           </p:stCondLst>
@@ -4439,7 +5027,7 @@
                                     </p:set>
                                     <p:animEffect transition="in" filter="fade">
                                       <p:cBhvr>
-                                        <p:cTn id="7" dur="500"/>
+                                        <p:cTn id="12" dur="500"/>
                                         <p:tgtEl>
                                           <p:spTgt spid="10"/>
                                         </p:tgtEl>
@@ -4449,14 +5037,14 @@
                                 </p:cTn>
                               </p:par>
                               <p:par>
-                                <p:cTn id="8" presetID="10" presetClass="entr" presetSubtype="0" fill="hold" nodeType="withEffect">
+                                <p:cTn id="13" presetID="10" presetClass="entr" presetSubtype="0" fill="hold" nodeType="withEffect">
                                   <p:stCondLst>
                                     <p:cond delay="0"/>
                                   </p:stCondLst>
                                   <p:childTnLst>
                                     <p:set>
                                       <p:cBhvr>
-                                        <p:cTn id="9" dur="1" fill="hold">
+                                        <p:cTn id="14" dur="1" fill="hold">
                                           <p:stCondLst>
                                             <p:cond delay="0"/>
                                           </p:stCondLst>
@@ -4474,7 +5062,7 @@
                                     </p:set>
                                     <p:animEffect transition="in" filter="fade">
                                       <p:cBhvr>
-                                        <p:cTn id="10" dur="500"/>
+                                        <p:cTn id="15" dur="500"/>
                                         <p:tgtEl>
                                           <p:spTgt spid="5"/>
                                         </p:tgtEl>
@@ -4490,26 +5078,26 @@
                     </p:cTn>
                   </p:par>
                   <p:par>
-                    <p:cTn id="11" fill="hold">
+                    <p:cTn id="16" fill="hold">
                       <p:stCondLst>
                         <p:cond delay="indefinite"/>
                       </p:stCondLst>
                       <p:childTnLst>
                         <p:par>
-                          <p:cTn id="12" fill="hold">
+                          <p:cTn id="17" fill="hold">
                             <p:stCondLst>
                               <p:cond delay="0"/>
                             </p:stCondLst>
                             <p:childTnLst>
                               <p:par>
-                                <p:cTn id="13" presetID="10" presetClass="entr" presetSubtype="0" fill="hold" grpId="0" nodeType="clickEffect">
+                                <p:cTn id="18" presetID="10" presetClass="entr" presetSubtype="0" fill="hold" grpId="0" nodeType="clickEffect">
                                   <p:stCondLst>
                                     <p:cond delay="0"/>
                                   </p:stCondLst>
                                   <p:childTnLst>
                                     <p:set>
                                       <p:cBhvr>
-                                        <p:cTn id="14" dur="1" fill="hold">
+                                        <p:cTn id="19" dur="1" fill="hold">
                                           <p:stCondLst>
                                             <p:cond delay="0"/>
                                           </p:stCondLst>
@@ -4527,7 +5115,7 @@
                                     </p:set>
                                     <p:animEffect transition="in" filter="fade">
                                       <p:cBhvr>
-                                        <p:cTn id="15" dur="500"/>
+                                        <p:cTn id="20" dur="500"/>
                                         <p:tgtEl>
                                           <p:spTgt spid="11"/>
                                         </p:tgtEl>
@@ -4537,14 +5125,14 @@
                                 </p:cTn>
                               </p:par>
                               <p:par>
-                                <p:cTn id="16" presetID="10" presetClass="entr" presetSubtype="0" fill="hold" grpId="0" nodeType="withEffect">
+                                <p:cTn id="21" presetID="10" presetClass="entr" presetSubtype="0" fill="hold" grpId="0" nodeType="withEffect">
                                   <p:stCondLst>
                                     <p:cond delay="0"/>
                                   </p:stCondLst>
                                   <p:childTnLst>
                                     <p:set>
                                       <p:cBhvr>
-                                        <p:cTn id="17" dur="1" fill="hold">
+                                        <p:cTn id="22" dur="1" fill="hold">
                                           <p:stCondLst>
                                             <p:cond delay="0"/>
                                           </p:stCondLst>
@@ -4562,7 +5150,7 @@
                                     </p:set>
                                     <p:animEffect transition="in" filter="fade">
                                       <p:cBhvr>
-                                        <p:cTn id="18" dur="500"/>
+                                        <p:cTn id="23" dur="500"/>
                                         <p:tgtEl>
                                           <p:spTgt spid="16"/>
                                         </p:tgtEl>
@@ -4578,26 +5166,26 @@
                     </p:cTn>
                   </p:par>
                   <p:par>
-                    <p:cTn id="19" fill="hold">
+                    <p:cTn id="24" fill="hold">
                       <p:stCondLst>
                         <p:cond delay="indefinite"/>
                       </p:stCondLst>
                       <p:childTnLst>
                         <p:par>
-                          <p:cTn id="20" fill="hold">
+                          <p:cTn id="25" fill="hold">
                             <p:stCondLst>
                               <p:cond delay="0"/>
                             </p:stCondLst>
                             <p:childTnLst>
                               <p:par>
-                                <p:cTn id="21" presetID="10" presetClass="entr" presetSubtype="0" fill="hold" grpId="0" nodeType="clickEffect">
+                                <p:cTn id="26" presetID="10" presetClass="entr" presetSubtype="0" fill="hold" grpId="0" nodeType="clickEffect">
                                   <p:stCondLst>
                                     <p:cond delay="0"/>
                                   </p:stCondLst>
                                   <p:childTnLst>
                                     <p:set>
                                       <p:cBhvr>
-                                        <p:cTn id="22" dur="1" fill="hold">
+                                        <p:cTn id="27" dur="1" fill="hold">
                                           <p:stCondLst>
                                             <p:cond delay="0"/>
                                           </p:stCondLst>
@@ -4615,7 +5203,7 @@
                                     </p:set>
                                     <p:animEffect transition="in" filter="fade">
                                       <p:cBhvr>
-                                        <p:cTn id="23" dur="500"/>
+                                        <p:cTn id="28" dur="500"/>
                                         <p:tgtEl>
                                           <p:spTgt spid="12"/>
                                         </p:tgtEl>
@@ -4625,14 +5213,14 @@
                                 </p:cTn>
                               </p:par>
                               <p:par>
-                                <p:cTn id="24" presetID="10" presetClass="entr" presetSubtype="0" fill="hold" grpId="0" nodeType="withEffect">
+                                <p:cTn id="29" presetID="10" presetClass="entr" presetSubtype="0" fill="hold" grpId="0" nodeType="withEffect">
                                   <p:stCondLst>
                                     <p:cond delay="0"/>
                                   </p:stCondLst>
                                   <p:childTnLst>
                                     <p:set>
                                       <p:cBhvr>
-                                        <p:cTn id="25" dur="1" fill="hold">
+                                        <p:cTn id="30" dur="1" fill="hold">
                                           <p:stCondLst>
                                             <p:cond delay="0"/>
                                           </p:stCondLst>
@@ -4650,7 +5238,7 @@
                                     </p:set>
                                     <p:animEffect transition="in" filter="fade">
                                       <p:cBhvr>
-                                        <p:cTn id="26" dur="500"/>
+                                        <p:cTn id="31" dur="500"/>
                                         <p:tgtEl>
                                           <p:spTgt spid="18"/>
                                         </p:tgtEl>

</xml_diff>

<commit_message>
Updated with the latest HomeUI design
</commit_message>
<xml_diff>
--- a/Documentation/Training/MainUI.pptx
+++ b/Documentation/Training/MainUI.pptx
@@ -227,7 +227,7 @@
           <a:p>
             <a:fld id="{E6799723-5C7A-4148-A580-1582FB869D21}" type="datetimeFigureOut">
               <a:rPr lang="en-GB" smtClean="0"/>
-              <a:t>30/10/2019</a:t>
+              <a:t>19/05/2020</a:t>
             </a:fld>
             <a:endParaRPr lang="en-GB"/>
           </a:p>
@@ -1133,7 +1133,7 @@
           <a:p>
             <a:fld id="{A4B2E03E-B9F4-48CD-BEDC-03BA93144C1F}" type="datetimeFigureOut">
               <a:rPr lang="en-GB" smtClean="0"/>
-              <a:t>30/10/2019</a:t>
+              <a:t>19/05/2020</a:t>
             </a:fld>
             <a:endParaRPr lang="en-GB"/>
           </a:p>
@@ -1303,7 +1303,7 @@
           <a:p>
             <a:fld id="{A4B2E03E-B9F4-48CD-BEDC-03BA93144C1F}" type="datetimeFigureOut">
               <a:rPr lang="en-GB" smtClean="0"/>
-              <a:t>30/10/2019</a:t>
+              <a:t>19/05/2020</a:t>
             </a:fld>
             <a:endParaRPr lang="en-GB"/>
           </a:p>
@@ -1483,7 +1483,7 @@
           <a:p>
             <a:fld id="{A4B2E03E-B9F4-48CD-BEDC-03BA93144C1F}" type="datetimeFigureOut">
               <a:rPr lang="en-GB" smtClean="0"/>
-              <a:t>30/10/2019</a:t>
+              <a:t>19/05/2020</a:t>
             </a:fld>
             <a:endParaRPr lang="en-GB"/>
           </a:p>
@@ -1653,7 +1653,7 @@
           <a:p>
             <a:fld id="{A4B2E03E-B9F4-48CD-BEDC-03BA93144C1F}" type="datetimeFigureOut">
               <a:rPr lang="en-GB" smtClean="0"/>
-              <a:t>30/10/2019</a:t>
+              <a:t>19/05/2020</a:t>
             </a:fld>
             <a:endParaRPr lang="en-GB"/>
           </a:p>
@@ -1899,7 +1899,7 @@
           <a:p>
             <a:fld id="{A4B2E03E-B9F4-48CD-BEDC-03BA93144C1F}" type="datetimeFigureOut">
               <a:rPr lang="en-GB" smtClean="0"/>
-              <a:t>30/10/2019</a:t>
+              <a:t>19/05/2020</a:t>
             </a:fld>
             <a:endParaRPr lang="en-GB"/>
           </a:p>
@@ -2131,7 +2131,7 @@
           <a:p>
             <a:fld id="{A4B2E03E-B9F4-48CD-BEDC-03BA93144C1F}" type="datetimeFigureOut">
               <a:rPr lang="en-GB" smtClean="0"/>
-              <a:t>30/10/2019</a:t>
+              <a:t>19/05/2020</a:t>
             </a:fld>
             <a:endParaRPr lang="en-GB"/>
           </a:p>
@@ -2498,7 +2498,7 @@
           <a:p>
             <a:fld id="{A4B2E03E-B9F4-48CD-BEDC-03BA93144C1F}" type="datetimeFigureOut">
               <a:rPr lang="en-GB" smtClean="0"/>
-              <a:t>30/10/2019</a:t>
+              <a:t>19/05/2020</a:t>
             </a:fld>
             <a:endParaRPr lang="en-GB"/>
           </a:p>
@@ -2616,7 +2616,7 @@
           <a:p>
             <a:fld id="{A4B2E03E-B9F4-48CD-BEDC-03BA93144C1F}" type="datetimeFigureOut">
               <a:rPr lang="en-GB" smtClean="0"/>
-              <a:t>30/10/2019</a:t>
+              <a:t>19/05/2020</a:t>
             </a:fld>
             <a:endParaRPr lang="en-GB"/>
           </a:p>
@@ -2711,7 +2711,7 @@
           <a:p>
             <a:fld id="{A4B2E03E-B9F4-48CD-BEDC-03BA93144C1F}" type="datetimeFigureOut">
               <a:rPr lang="en-GB" smtClean="0"/>
-              <a:t>30/10/2019</a:t>
+              <a:t>19/05/2020</a:t>
             </a:fld>
             <a:endParaRPr lang="en-GB"/>
           </a:p>
@@ -2988,7 +2988,7 @@
           <a:p>
             <a:fld id="{A4B2E03E-B9F4-48CD-BEDC-03BA93144C1F}" type="datetimeFigureOut">
               <a:rPr lang="en-GB" smtClean="0"/>
-              <a:t>30/10/2019</a:t>
+              <a:t>19/05/2020</a:t>
             </a:fld>
             <a:endParaRPr lang="en-GB"/>
           </a:p>
@@ -3241,7 +3241,7 @@
           <a:p>
             <a:fld id="{A4B2E03E-B9F4-48CD-BEDC-03BA93144C1F}" type="datetimeFigureOut">
               <a:rPr lang="en-GB" smtClean="0"/>
-              <a:t>30/10/2019</a:t>
+              <a:t>19/05/2020</a:t>
             </a:fld>
             <a:endParaRPr lang="en-GB"/>
           </a:p>
@@ -3454,7 +3454,7 @@
           <a:p>
             <a:fld id="{A4B2E03E-B9F4-48CD-BEDC-03BA93144C1F}" type="datetimeFigureOut">
               <a:rPr lang="en-GB" smtClean="0"/>
-              <a:t>30/10/2019</a:t>
+              <a:t>19/05/2020</a:t>
             </a:fld>
             <a:endParaRPr lang="en-GB"/>
           </a:p>
@@ -6259,12 +6259,40 @@
           <a:chExt cx="0" cy="0"/>
         </a:xfrm>
       </p:grpSpPr>
+      <p:sp>
+        <p:nvSpPr>
+          <p:cNvPr id="2" name="Title 1">
+            <a:extLst>
+              <a:ext uri="{FF2B5EF4-FFF2-40B4-BE49-F238E27FC236}">
+                <a16:creationId xmlns:a16="http://schemas.microsoft.com/office/drawing/2014/main" id="{23E318B5-054B-4CD2-B99E-6A438EC7F635}"/>
+              </a:ext>
+            </a:extLst>
+          </p:cNvPr>
+          <p:cNvSpPr>
+            <a:spLocks noGrp="1"/>
+          </p:cNvSpPr>
+          <p:nvPr>
+            <p:ph type="title"/>
+          </p:nvPr>
+        </p:nvSpPr>
+        <p:spPr/>
+        <p:txBody>
+          <a:bodyPr/>
+          <a:lstStyle/>
+          <a:p>
+            <a:r>
+              <a:rPr lang="en-GB" dirty="0"/>
+              <a:t>Home</a:t>
+            </a:r>
+          </a:p>
+        </p:txBody>
+      </p:sp>
       <p:pic>
         <p:nvPicPr>
-          <p:cNvPr id="6" name="Picture 5">
+          <p:cNvPr id="4" name="Picture 3">
             <a:extLst>
               <a:ext uri="{FF2B5EF4-FFF2-40B4-BE49-F238E27FC236}">
-                <a16:creationId xmlns:a16="http://schemas.microsoft.com/office/drawing/2014/main" id="{0E6358A3-2417-49C3-9E1A-A9AC6153B3C8}"/>
+                <a16:creationId xmlns:a16="http://schemas.microsoft.com/office/drawing/2014/main" id="{236F0988-E3AA-49DF-A72B-E2BC8E71D96E}"/>
               </a:ext>
             </a:extLst>
           </p:cNvPr>
@@ -6281,42 +6309,14 @@
         </p:blipFill>
         <p:spPr>
           <a:xfrm>
-            <a:off x="3480495" y="906326"/>
-            <a:ext cx="8310623" cy="5243551"/>
+            <a:off x="2921101" y="1456406"/>
+            <a:ext cx="6349797" cy="5324917"/>
           </a:xfrm>
           <a:prstGeom prst="rect">
             <a:avLst/>
           </a:prstGeom>
         </p:spPr>
       </p:pic>
-      <p:sp>
-        <p:nvSpPr>
-          <p:cNvPr id="2" name="Title 1">
-            <a:extLst>
-              <a:ext uri="{FF2B5EF4-FFF2-40B4-BE49-F238E27FC236}">
-                <a16:creationId xmlns:a16="http://schemas.microsoft.com/office/drawing/2014/main" id="{23E318B5-054B-4CD2-B99E-6A438EC7F635}"/>
-              </a:ext>
-            </a:extLst>
-          </p:cNvPr>
-          <p:cNvSpPr>
-            <a:spLocks noGrp="1"/>
-          </p:cNvSpPr>
-          <p:nvPr>
-            <p:ph type="title"/>
-          </p:nvPr>
-        </p:nvSpPr>
-        <p:spPr/>
-        <p:txBody>
-          <a:bodyPr/>
-          <a:lstStyle/>
-          <a:p>
-            <a:r>
-              <a:rPr lang="en-GB" dirty="0"/>
-              <a:t>Home</a:t>
-            </a:r>
-          </a:p>
-        </p:txBody>
-      </p:sp>
     </p:spTree>
     <p:extLst>
       <p:ext uri="{BB962C8B-B14F-4D97-AF65-F5344CB8AC3E}">
@@ -6349,10 +6349,10 @@
       </p:grpSpPr>
       <p:pic>
         <p:nvPicPr>
-          <p:cNvPr id="6" name="Picture 5">
+          <p:cNvPr id="3" name="Picture 2">
             <a:extLst>
               <a:ext uri="{FF2B5EF4-FFF2-40B4-BE49-F238E27FC236}">
-                <a16:creationId xmlns:a16="http://schemas.microsoft.com/office/drawing/2014/main" id="{0E6358A3-2417-49C3-9E1A-A9AC6153B3C8}"/>
+                <a16:creationId xmlns:a16="http://schemas.microsoft.com/office/drawing/2014/main" id="{85D840BF-092B-42BC-8BBE-1AB1A569F421}"/>
               </a:ext>
             </a:extLst>
           </p:cNvPr>
@@ -6361,15 +6361,16 @@
           </p:cNvPicPr>
           <p:nvPr/>
         </p:nvPicPr>
-        <p:blipFill rotWithShape="1">
+        <p:blipFill>
           <a:blip r:embed="rId2"/>
-          <a:srcRect r="49643" b="40850"/>
-          <a:stretch/>
+          <a:stretch>
+            <a:fillRect/>
+          </a:stretch>
         </p:blipFill>
         <p:spPr>
           <a:xfrm>
-            <a:off x="7168802" y="706159"/>
-            <a:ext cx="4184998" cy="3101567"/>
+            <a:off x="6819331" y="862442"/>
+            <a:ext cx="5372669" cy="2263525"/>
           </a:xfrm>
           <a:prstGeom prst="rect">
             <a:avLst/>
@@ -6457,9 +6458,9 @@
         </p:nvGrpSpPr>
         <p:grpSpPr>
           <a:xfrm>
-            <a:off x="10222174" y="3471081"/>
+            <a:off x="6812224" y="2611749"/>
             <a:ext cx="1403445" cy="1524576"/>
-            <a:chOff x="6146325" y="1388582"/>
+            <a:chOff x="6165375" y="1486019"/>
             <a:chExt cx="1403445" cy="1524576"/>
           </a:xfrm>
         </p:grpSpPr>
@@ -6477,7 +6478,7 @@
           </p:nvSpPr>
           <p:spPr>
             <a:xfrm>
-              <a:off x="6146325" y="2483704"/>
+              <a:off x="6165375" y="2581141"/>
               <a:ext cx="1403445" cy="429454"/>
             </a:xfrm>
             <a:prstGeom prst="roundRect">
@@ -6529,7 +6530,7 @@
           </p:nvCxnSpPr>
           <p:spPr>
             <a:xfrm flipV="1">
-              <a:off x="6848048" y="1388582"/>
+              <a:off x="6867098" y="1486019"/>
               <a:ext cx="217225" cy="1095122"/>
             </a:xfrm>
             <a:prstGeom prst="straightConnector1">

</xml_diff>